<commit_message>
UPDATES on the presentation
</commit_message>
<xml_diff>
--- a/DataSciencePresentation.pptx
+++ b/DataSciencePresentation.pptx
@@ -5,10 +5,10 @@
     <p:sldMasterId id="2147483648" r:id="rId6"/>
   </p:sldMasterIdLst>
   <p:notesMasterIdLst>
-    <p:notesMasterId r:id="rId27"/>
+    <p:notesMasterId r:id="rId31"/>
   </p:notesMasterIdLst>
   <p:handoutMasterIdLst>
-    <p:handoutMasterId r:id="rId28"/>
+    <p:handoutMasterId r:id="rId32"/>
   </p:handoutMasterIdLst>
   <p:sldIdLst>
     <p:sldId id="516" r:id="rId7"/>
@@ -22,15 +22,19 @@
     <p:sldId id="523" r:id="rId15"/>
     <p:sldId id="536" r:id="rId16"/>
     <p:sldId id="535" r:id="rId17"/>
-    <p:sldId id="524" r:id="rId18"/>
-    <p:sldId id="525" r:id="rId19"/>
-    <p:sldId id="537" r:id="rId20"/>
-    <p:sldId id="538" r:id="rId21"/>
-    <p:sldId id="539" r:id="rId22"/>
-    <p:sldId id="528" r:id="rId23"/>
-    <p:sldId id="529" r:id="rId24"/>
-    <p:sldId id="530" r:id="rId25"/>
-    <p:sldId id="531" r:id="rId26"/>
+    <p:sldId id="525" r:id="rId18"/>
+    <p:sldId id="537" r:id="rId19"/>
+    <p:sldId id="538" r:id="rId20"/>
+    <p:sldId id="539" r:id="rId21"/>
+    <p:sldId id="528" r:id="rId22"/>
+    <p:sldId id="541" r:id="rId23"/>
+    <p:sldId id="542" r:id="rId24"/>
+    <p:sldId id="544" r:id="rId25"/>
+    <p:sldId id="543" r:id="rId26"/>
+    <p:sldId id="545" r:id="rId27"/>
+    <p:sldId id="529" r:id="rId28"/>
+    <p:sldId id="530" r:id="rId29"/>
+    <p:sldId id="531" r:id="rId30"/>
   </p:sldIdLst>
   <p:sldSz cx="9144000" cy="6858000" type="screen4x3"/>
   <p:notesSz cx="6858000" cy="9144000"/>
@@ -145,12 +149,16 @@
             <p14:sldId id="523"/>
             <p14:sldId id="536"/>
             <p14:sldId id="535"/>
-            <p14:sldId id="524"/>
             <p14:sldId id="525"/>
             <p14:sldId id="537"/>
             <p14:sldId id="538"/>
             <p14:sldId id="539"/>
             <p14:sldId id="528"/>
+            <p14:sldId id="541"/>
+            <p14:sldId id="542"/>
+            <p14:sldId id="544"/>
+            <p14:sldId id="543"/>
+            <p14:sldId id="545"/>
             <p14:sldId id="529"/>
             <p14:sldId id="530"/>
             <p14:sldId id="531"/>
@@ -162,7 +170,7 @@
       </p14:sectionLst>
     </p:ext>
     <p:ext uri="{EFAFB233-063F-42B5-8137-9DF3F51BA10A}">
-      <p15:sldGuideLst xmlns="" xmlns:p15="http://schemas.microsoft.com/office/powerpoint/2012/main">
+      <p15:sldGuideLst xmlns:p15="http://schemas.microsoft.com/office/powerpoint/2012/main" xmlns="">
         <p15:guide id="1" orient="horz" pos="2160">
           <p15:clr>
             <a:srgbClr val="A4A3A4"/>
@@ -8712,7 +8720,7 @@
               <a:rPr lang="en-US" smtClean="0">
                 <a:latin typeface="Arial" charset="0"/>
               </a:rPr>
-              <a:t>1/22/2018</a:t>
+              <a:t>1/29/2018</a:t>
             </a:fld>
             <a:endParaRPr lang="en-US" dirty="0">
               <a:latin typeface="Arial" charset="0"/>
@@ -8890,7 +8898,7 @@
             <a:fld id="{EA0B0923-116C-49FA-B24A-9794571768C4}" type="datetimeFigureOut">
               <a:rPr lang="en-US" smtClean="0"/>
               <a:pPr/>
-              <a:t>1/22/2018</a:t>
+              <a:t>1/29/2018</a:t>
             </a:fld>
             <a:endParaRPr lang="en-US" dirty="0"/>
           </a:p>
@@ -9309,7 +9317,7 @@
           <a:p>
             <a:fld id="{F23EEDA6-C444-400B-9265-AA145BEA4DAB}" type="datetime8">
               <a:rPr lang="en-US" smtClean="0"/>
-              <a:t>1/22/2018 2:50 PM</a:t>
+              <a:t>1/29/2018 11:47 AM</a:t>
             </a:fld>
             <a:endParaRPr lang="en-US" dirty="0"/>
           </a:p>
@@ -9475,7 +9483,7 @@
           <a:p>
             <a:fld id="{F64C424B-C749-4819-BEAF-C73A3A7C174A}" type="datetime8">
               <a:rPr lang="en-US" smtClean="0"/>
-              <a:t>1/22/2018 2:50 PM</a:t>
+              <a:t>1/29/2018 11:47 AM</a:t>
             </a:fld>
             <a:endParaRPr lang="en-US" dirty="0"/>
           </a:p>
@@ -9579,16 +9587,6 @@
           <a:bodyPr/>
           <a:lstStyle/>
           <a:p>
-            <a:r>
-              <a:rPr lang="en-IE" dirty="0" smtClean="0"/>
-              <a:t>Skills needed by data scientists:</a:t>
-            </a:r>
-          </a:p>
-          <a:p>
-            <a:r>
-              <a:rPr lang="en-IE" dirty="0" smtClean="0"/>
-              <a:t>LOTS of different skills. One cannot hope to know them all: TEAMS!!!</a:t>
-            </a:r>
             <a:endParaRPr lang="en-US" dirty="0"/>
           </a:p>
         </p:txBody>
@@ -9653,7 +9651,7 @@
           <a:p>
             <a:fld id="{F64C424B-C749-4819-BEAF-C73A3A7C174A}" type="datetime8">
               <a:rPr lang="en-US" smtClean="0"/>
-              <a:t>1/22/2018 2:50 PM</a:t>
+              <a:t>1/29/2018 11:47 AM</a:t>
             </a:fld>
             <a:endParaRPr lang="en-US" dirty="0"/>
           </a:p>
@@ -9821,7 +9819,7 @@
           <a:p>
             <a:fld id="{F64C424B-C749-4819-BEAF-C73A3A7C174A}" type="datetime8">
               <a:rPr lang="en-US" smtClean="0"/>
-              <a:t>1/26/2018 10:41 AM</a:t>
+              <a:t>1/29/2018 2:07 PM</a:t>
             </a:fld>
             <a:endParaRPr lang="en-US" dirty="0"/>
           </a:p>
@@ -9925,6 +9923,14 @@
           <a:bodyPr/>
           <a:lstStyle/>
           <a:p>
+            <a:r>
+              <a:rPr lang="en-IE" dirty="0" smtClean="0"/>
+              <a:t>Ronald Coase: Nobel for Science</a:t>
+            </a:r>
+            <a:r>
+              <a:rPr lang="en-IE" baseline="0" dirty="0" smtClean="0"/>
+              <a:t> of Economy in 1991. Known for eponymous theorem on property rights.</a:t>
+            </a:r>
             <a:endParaRPr lang="en-US" dirty="0"/>
           </a:p>
         </p:txBody>
@@ -9989,7 +9995,7 @@
           <a:p>
             <a:fld id="{F64C424B-C749-4819-BEAF-C73A3A7C174A}" type="datetime8">
               <a:rPr lang="en-US" smtClean="0"/>
-              <a:t>1/26/2018 10:53 AM</a:t>
+              <a:t>1/29/2018 11:47 AM</a:t>
             </a:fld>
             <a:endParaRPr lang="en-US" dirty="0"/>
           </a:p>
@@ -10095,13 +10101,153 @@
           <a:p>
             <a:r>
               <a:rPr lang="en-IE" dirty="0" smtClean="0"/>
-              <a:t>Ronald Coase: Nobel for Science</a:t>
+              <a:t>False positive paradox</a:t>
+            </a:r>
+          </a:p>
+          <a:p>
+            <a:r>
+              <a:rPr lang="en-IE" dirty="0" smtClean="0"/>
+              <a:t>Simpson’s paradox</a:t>
+            </a:r>
+          </a:p>
+          <a:p>
+            <a:r>
+              <a:rPr lang="en-IE" dirty="0" smtClean="0"/>
+              <a:t>Meaningful metrics (accuracy and error types)</a:t>
+            </a:r>
+          </a:p>
+          <a:p>
+            <a:r>
+              <a:rPr lang="en-IE" dirty="0" smtClean="0"/>
+              <a:t>Accuracy vs. predictive power</a:t>
+            </a:r>
+          </a:p>
+          <a:p>
+            <a:r>
+              <a:rPr lang="en-IE" dirty="0" smtClean="0"/>
+              <a:t>Correlation vs. Causality</a:t>
+            </a:r>
+            <a:endParaRPr lang="en-US" dirty="0" smtClean="0"/>
+          </a:p>
+          <a:p>
+            <a:endParaRPr lang="en-IE" dirty="0" smtClean="0"/>
+          </a:p>
+          <a:p>
+            <a:endParaRPr lang="en-IE" dirty="0" smtClean="0"/>
+          </a:p>
+          <a:p>
+            <a:r>
+              <a:rPr lang="en-IE" dirty="0" smtClean="0"/>
+              <a:t>False positive paradox:</a:t>
+            </a:r>
+          </a:p>
+          <a:p>
+            <a:r>
+              <a:rPr lang="en-IE" dirty="0" smtClean="0"/>
+              <a:t>HIV probability IF tested positive (low incidence</a:t>
             </a:r>
             <a:r>
               <a:rPr lang="en-IE" baseline="0" dirty="0" smtClean="0"/>
-              <a:t> of Economy in 1991. Known for eponymous theorem on property rights.</a:t>
-            </a:r>
-            <a:endParaRPr lang="en-US" dirty="0"/>
+              <a:t> population</a:t>
+            </a:r>
+            <a:r>
+              <a:rPr lang="en-IE" dirty="0" smtClean="0"/>
+              <a:t>):</a:t>
+            </a:r>
+          </a:p>
+          <a:p>
+            <a:r>
+              <a:rPr lang="en-IE" dirty="0" smtClean="0"/>
+              <a:t>1000 tests,</a:t>
+            </a:r>
+            <a:r>
+              <a:rPr lang="en-IE" baseline="0" dirty="0" smtClean="0"/>
+              <a:t> 2% infected, FPR 5% (95% accuracy) </a:t>
+            </a:r>
+            <a:r>
+              <a:rPr lang="en-IE" baseline="0" dirty="0" smtClean="0">
+                <a:sym typeface="Wingdings" panose="05000000000000000000" pitchFamily="2" charset="2"/>
+              </a:rPr>
+              <a:t> 1000 * 0.02 = 20 TP, 1000 * (100 - 2) / 100 * 0.05 = 49 FP</a:t>
+            </a:r>
+          </a:p>
+          <a:p>
+            <a:pPr marL="171450" indent="-171450">
+              <a:buFont typeface="Wingdings"/>
+              <a:buChar char="à"/>
+            </a:pPr>
+            <a:r>
+              <a:rPr lang="en-IE" baseline="0" dirty="0" err="1" smtClean="0">
+                <a:sym typeface="Wingdings" panose="05000000000000000000" pitchFamily="2" charset="2"/>
+              </a:rPr>
+              <a:t>Prob</a:t>
+            </a:r>
+            <a:r>
+              <a:rPr lang="en-IE" baseline="0" dirty="0" smtClean="0">
+                <a:sym typeface="Wingdings" panose="05000000000000000000" pitchFamily="2" charset="2"/>
+              </a:rPr>
+              <a:t> of positive if tested positive = 20 / (20 + 49) = 29%</a:t>
+            </a:r>
+          </a:p>
+          <a:p>
+            <a:pPr marL="0" indent="0">
+              <a:buFont typeface="Wingdings"/>
+              <a:buNone/>
+            </a:pPr>
+            <a:endParaRPr lang="en-IE" baseline="0" dirty="0">
+              <a:sym typeface="Wingdings" panose="05000000000000000000" pitchFamily="2" charset="2"/>
+            </a:endParaRPr>
+          </a:p>
+          <a:p>
+            <a:pPr marL="0" indent="0">
+              <a:buFont typeface="Wingdings"/>
+              <a:buNone/>
+            </a:pPr>
+            <a:r>
+              <a:rPr lang="en-IE" baseline="0" dirty="0" smtClean="0">
+                <a:sym typeface="Wingdings" panose="05000000000000000000" pitchFamily="2" charset="2"/>
+              </a:rPr>
+              <a:t>Simpson’s paradox: a trend appearing in different groups might change when groups are combined.</a:t>
+            </a:r>
+          </a:p>
+          <a:p>
+            <a:pPr marL="0" indent="0">
+              <a:buFont typeface="Wingdings"/>
+              <a:buNone/>
+            </a:pPr>
+            <a:endParaRPr lang="en-IE" baseline="0" dirty="0" smtClean="0">
+              <a:sym typeface="Wingdings" panose="05000000000000000000" pitchFamily="2" charset="2"/>
+            </a:endParaRPr>
+          </a:p>
+          <a:p>
+            <a:pPr marL="0" indent="0">
+              <a:buFont typeface="Wingdings"/>
+              <a:buNone/>
+            </a:pPr>
+            <a:r>
+              <a:rPr lang="en-IE" baseline="0" dirty="0" smtClean="0">
+                <a:sym typeface="Wingdings" panose="05000000000000000000" pitchFamily="2" charset="2"/>
+              </a:rPr>
+              <a:t>99% results on 95% requirements: Naïve model.</a:t>
+            </a:r>
+          </a:p>
+          <a:p>
+            <a:pPr marL="0" indent="0">
+              <a:buFont typeface="Wingdings"/>
+              <a:buNone/>
+            </a:pPr>
+            <a:endParaRPr lang="en-IE" baseline="0" dirty="0" smtClean="0">
+              <a:sym typeface="Wingdings" panose="05000000000000000000" pitchFamily="2" charset="2"/>
+            </a:endParaRPr>
+          </a:p>
+          <a:p>
+            <a:pPr marL="0" indent="0">
+              <a:buFont typeface="Wingdings"/>
+              <a:buNone/>
+            </a:pPr>
+            <a:endParaRPr lang="en-IE" baseline="0" dirty="0" smtClean="0">
+              <a:sym typeface="Wingdings" panose="05000000000000000000" pitchFamily="2" charset="2"/>
+            </a:endParaRPr>
           </a:p>
         </p:txBody>
       </p:sp>
@@ -10165,7 +10311,7 @@
           <a:p>
             <a:fld id="{F64C424B-C749-4819-BEAF-C73A3A7C174A}" type="datetime8">
               <a:rPr lang="en-US" smtClean="0"/>
-              <a:t>1/26/2018 11:45 AM</a:t>
+              <a:t>1/29/2018 11:47 AM</a:t>
             </a:fld>
             <a:endParaRPr lang="en-US" dirty="0"/>
           </a:p>
@@ -10271,153 +10417,61 @@
           <a:p>
             <a:r>
               <a:rPr lang="en-IE" dirty="0" smtClean="0"/>
-              <a:t>False positive paradox</a:t>
-            </a:r>
+              <a:t>MAIN FOCUS HERE!!!</a:t>
+            </a:r>
+          </a:p>
+          <a:p>
+            <a:endParaRPr lang="en-IE" dirty="0" smtClean="0"/>
           </a:p>
           <a:p>
             <a:r>
               <a:rPr lang="en-IE" dirty="0" smtClean="0"/>
-              <a:t>Simpson’s paradox</a:t>
+              <a:t>Energy load forecasting</a:t>
             </a:r>
           </a:p>
           <a:p>
             <a:r>
               <a:rPr lang="en-IE" dirty="0" smtClean="0"/>
-              <a:t>Meaningful metrics (accuracy and error types)</a:t>
+              <a:t>Workload interaction assessment in data centres</a:t>
             </a:r>
           </a:p>
           <a:p>
             <a:r>
               <a:rPr lang="en-IE" dirty="0" smtClean="0"/>
-              <a:t>Accuracy vs. predictive power</a:t>
+              <a:t>Anomaly detection in server behaviour</a:t>
             </a:r>
           </a:p>
           <a:p>
             <a:r>
               <a:rPr lang="en-IE" dirty="0" smtClean="0"/>
-              <a:t>Correlation vs. Causality</a:t>
-            </a:r>
+              <a:t>Intelligent agents in data centres (preventive maintenance, near-real-time corrective actions)</a:t>
+            </a:r>
+          </a:p>
+          <a:p>
+            <a:r>
+              <a:rPr lang="en-IE" dirty="0" smtClean="0"/>
+              <a:t>Call centre optimization (optimizer engine and feature extraction, repeat callers, </a:t>
+            </a:r>
+            <a:r>
+              <a:rPr lang="en-IE" dirty="0" err="1" smtClean="0"/>
+              <a:t>auth</a:t>
+            </a:r>
+            <a:r>
+              <a:rPr lang="en-IE" dirty="0" smtClean="0"/>
+              <a:t> rate, IVR optimization, Population segmentation)</a:t>
+            </a:r>
+          </a:p>
+          <a:p>
+            <a:r>
+              <a:rPr lang="en-IE" dirty="0" smtClean="0"/>
+              <a:t>Early diagnosis suggestions</a:t>
+            </a:r>
+          </a:p>
+          <a:p>
             <a:endParaRPr lang="en-US" dirty="0" smtClean="0"/>
           </a:p>
           <a:p>
-            <a:endParaRPr lang="en-IE" dirty="0" smtClean="0"/>
-          </a:p>
-          <a:p>
-            <a:endParaRPr lang="en-IE" dirty="0" smtClean="0"/>
-          </a:p>
-          <a:p>
-            <a:r>
-              <a:rPr lang="en-IE" dirty="0" smtClean="0"/>
-              <a:t>False positive paradox:</a:t>
-            </a:r>
-          </a:p>
-          <a:p>
-            <a:r>
-              <a:rPr lang="en-IE" dirty="0" smtClean="0"/>
-              <a:t>HIV probability IF tested positive (low incidence</a:t>
-            </a:r>
-            <a:r>
-              <a:rPr lang="en-IE" baseline="0" dirty="0" smtClean="0"/>
-              <a:t> population</a:t>
-            </a:r>
-            <a:r>
-              <a:rPr lang="en-IE" dirty="0" smtClean="0"/>
-              <a:t>):</a:t>
-            </a:r>
-          </a:p>
-          <a:p>
-            <a:r>
-              <a:rPr lang="en-IE" dirty="0" smtClean="0"/>
-              <a:t>1000 tests,</a:t>
-            </a:r>
-            <a:r>
-              <a:rPr lang="en-IE" baseline="0" dirty="0" smtClean="0"/>
-              <a:t> 2% infected, FPR 5% (95% accuracy) </a:t>
-            </a:r>
-            <a:r>
-              <a:rPr lang="en-IE" baseline="0" dirty="0" smtClean="0">
-                <a:sym typeface="Wingdings" panose="05000000000000000000" pitchFamily="2" charset="2"/>
-              </a:rPr>
-              <a:t> 1000 * 0.02 = 20 TP, 1000 * (100 - 2) / 100 * 0.05 = 49 FP</a:t>
-            </a:r>
-          </a:p>
-          <a:p>
-            <a:pPr marL="171450" indent="-171450">
-              <a:buFont typeface="Wingdings"/>
-              <a:buChar char="à"/>
-            </a:pPr>
-            <a:r>
-              <a:rPr lang="en-IE" baseline="0" dirty="0" err="1" smtClean="0">
-                <a:sym typeface="Wingdings" panose="05000000000000000000" pitchFamily="2" charset="2"/>
-              </a:rPr>
-              <a:t>Prob</a:t>
-            </a:r>
-            <a:r>
-              <a:rPr lang="en-IE" baseline="0" dirty="0" smtClean="0">
-                <a:sym typeface="Wingdings" panose="05000000000000000000" pitchFamily="2" charset="2"/>
-              </a:rPr>
-              <a:t> of positive if tested positive = 20 / (20 + 49) = 29%</a:t>
-            </a:r>
-          </a:p>
-          <a:p>
-            <a:pPr marL="0" indent="0">
-              <a:buFont typeface="Wingdings"/>
-              <a:buNone/>
-            </a:pPr>
-            <a:endParaRPr lang="en-IE" baseline="0" dirty="0">
-              <a:sym typeface="Wingdings" panose="05000000000000000000" pitchFamily="2" charset="2"/>
-            </a:endParaRPr>
-          </a:p>
-          <a:p>
-            <a:pPr marL="0" indent="0">
-              <a:buFont typeface="Wingdings"/>
-              <a:buNone/>
-            </a:pPr>
-            <a:r>
-              <a:rPr lang="en-IE" baseline="0" dirty="0" smtClean="0">
-                <a:sym typeface="Wingdings" panose="05000000000000000000" pitchFamily="2" charset="2"/>
-              </a:rPr>
-              <a:t>Simpson’s paradox: a trend appearing in different groups might change when groups are combined.</a:t>
-            </a:r>
-          </a:p>
-          <a:p>
-            <a:pPr marL="0" indent="0">
-              <a:buFont typeface="Wingdings"/>
-              <a:buNone/>
-            </a:pPr>
-            <a:endParaRPr lang="en-IE" baseline="0" dirty="0" smtClean="0">
-              <a:sym typeface="Wingdings" panose="05000000000000000000" pitchFamily="2" charset="2"/>
-            </a:endParaRPr>
-          </a:p>
-          <a:p>
-            <a:pPr marL="0" indent="0">
-              <a:buFont typeface="Wingdings"/>
-              <a:buNone/>
-            </a:pPr>
-            <a:r>
-              <a:rPr lang="en-IE" baseline="0" dirty="0" smtClean="0">
-                <a:sym typeface="Wingdings" panose="05000000000000000000" pitchFamily="2" charset="2"/>
-              </a:rPr>
-              <a:t>99% results on 95% requirements: Naïve model.</a:t>
-            </a:r>
-          </a:p>
-          <a:p>
-            <a:pPr marL="0" indent="0">
-              <a:buFont typeface="Wingdings"/>
-              <a:buNone/>
-            </a:pPr>
-            <a:endParaRPr lang="en-IE" baseline="0" dirty="0" smtClean="0">
-              <a:sym typeface="Wingdings" panose="05000000000000000000" pitchFamily="2" charset="2"/>
-            </a:endParaRPr>
-          </a:p>
-          <a:p>
-            <a:pPr marL="0" indent="0">
-              <a:buFont typeface="Wingdings"/>
-              <a:buNone/>
-            </a:pPr>
-            <a:endParaRPr lang="en-IE" baseline="0" dirty="0" smtClean="0">
-              <a:sym typeface="Wingdings" panose="05000000000000000000" pitchFamily="2" charset="2"/>
-            </a:endParaRPr>
+            <a:endParaRPr lang="en-US" dirty="0"/>
           </a:p>
         </p:txBody>
       </p:sp>
@@ -10481,7 +10535,7 @@
           <a:p>
             <a:fld id="{F64C424B-C749-4819-BEAF-C73A3A7C174A}" type="datetime8">
               <a:rPr lang="en-US" smtClean="0"/>
-              <a:t>1/26/2018 3:09 PM</a:t>
+              <a:t>1/29/2018 11:47 AM</a:t>
             </a:fld>
             <a:endParaRPr lang="en-US" dirty="0"/>
           </a:p>
@@ -10589,6 +10643,58 @@
               <a:rPr lang="en-IE" dirty="0" smtClean="0"/>
               <a:t>MAIN FOCUS HERE!!!</a:t>
             </a:r>
+          </a:p>
+          <a:p>
+            <a:endParaRPr lang="en-IE" dirty="0" smtClean="0"/>
+          </a:p>
+          <a:p>
+            <a:r>
+              <a:rPr lang="en-IE" dirty="0" smtClean="0"/>
+              <a:t>Energy load forecasting</a:t>
+            </a:r>
+          </a:p>
+          <a:p>
+            <a:r>
+              <a:rPr lang="en-IE" dirty="0" smtClean="0"/>
+              <a:t>Workload interaction assessment in data centres</a:t>
+            </a:r>
+          </a:p>
+          <a:p>
+            <a:r>
+              <a:rPr lang="en-IE" dirty="0" smtClean="0"/>
+              <a:t>Anomaly detection in server behaviour</a:t>
+            </a:r>
+          </a:p>
+          <a:p>
+            <a:r>
+              <a:rPr lang="en-IE" dirty="0" smtClean="0"/>
+              <a:t>Intelligent agents in data centres (preventive maintenance, near-real-time corrective actions)</a:t>
+            </a:r>
+          </a:p>
+          <a:p>
+            <a:r>
+              <a:rPr lang="en-IE" dirty="0" smtClean="0"/>
+              <a:t>Call centre optimization (optimizer engine and feature extraction, repeat callers, </a:t>
+            </a:r>
+            <a:r>
+              <a:rPr lang="en-IE" dirty="0" err="1" smtClean="0"/>
+              <a:t>auth</a:t>
+            </a:r>
+            <a:r>
+              <a:rPr lang="en-IE" dirty="0" smtClean="0"/>
+              <a:t> rate, IVR optimization, Population segmentation)</a:t>
+            </a:r>
+          </a:p>
+          <a:p>
+            <a:r>
+              <a:rPr lang="en-IE" dirty="0" smtClean="0"/>
+              <a:t>Early diagnosis suggestions</a:t>
+            </a:r>
+          </a:p>
+          <a:p>
+            <a:endParaRPr lang="en-US" dirty="0" smtClean="0"/>
+          </a:p>
+          <a:p>
             <a:endParaRPr lang="en-US" dirty="0"/>
           </a:p>
         </p:txBody>
@@ -10653,7 +10759,7 @@
           <a:p>
             <a:fld id="{F64C424B-C749-4819-BEAF-C73A3A7C174A}" type="datetime8">
               <a:rPr lang="en-US" smtClean="0"/>
-              <a:t>1/26/2018 11:44 AM</a:t>
+              <a:t>1/29/2018 11:47 AM</a:t>
             </a:fld>
             <a:endParaRPr lang="en-US" dirty="0"/>
           </a:p>
@@ -10757,6 +10863,62 @@
           <a:bodyPr/>
           <a:lstStyle/>
           <a:p>
+            <a:r>
+              <a:rPr lang="en-IE" dirty="0" smtClean="0"/>
+              <a:t>MAIN FOCUS HERE!!!</a:t>
+            </a:r>
+          </a:p>
+          <a:p>
+            <a:endParaRPr lang="en-IE" dirty="0" smtClean="0"/>
+          </a:p>
+          <a:p>
+            <a:r>
+              <a:rPr lang="en-IE" dirty="0" smtClean="0"/>
+              <a:t>Energy load forecasting</a:t>
+            </a:r>
+          </a:p>
+          <a:p>
+            <a:r>
+              <a:rPr lang="en-IE" dirty="0" smtClean="0"/>
+              <a:t>Workload interaction assessment in data centres</a:t>
+            </a:r>
+          </a:p>
+          <a:p>
+            <a:r>
+              <a:rPr lang="en-IE" dirty="0" smtClean="0"/>
+              <a:t>Anomaly detection in server behaviour</a:t>
+            </a:r>
+          </a:p>
+          <a:p>
+            <a:r>
+              <a:rPr lang="en-IE" dirty="0" smtClean="0"/>
+              <a:t>Intelligent agents in data centres (preventive maintenance, near-real-time corrective actions)</a:t>
+            </a:r>
+          </a:p>
+          <a:p>
+            <a:r>
+              <a:rPr lang="en-IE" dirty="0" smtClean="0"/>
+              <a:t>Call centre optimization (optimizer engine and feature extraction, repeat callers, </a:t>
+            </a:r>
+            <a:r>
+              <a:rPr lang="en-IE" dirty="0" err="1" smtClean="0"/>
+              <a:t>auth</a:t>
+            </a:r>
+            <a:r>
+              <a:rPr lang="en-IE" dirty="0" smtClean="0"/>
+              <a:t> rate, IVR optimization, Population segmentation)</a:t>
+            </a:r>
+          </a:p>
+          <a:p>
+            <a:r>
+              <a:rPr lang="en-IE" dirty="0" smtClean="0"/>
+              <a:t>Early diagnosis suggestions</a:t>
+            </a:r>
+          </a:p>
+          <a:p>
+            <a:endParaRPr lang="en-US" dirty="0" smtClean="0"/>
+          </a:p>
+          <a:p>
             <a:endParaRPr lang="en-US" dirty="0"/>
           </a:p>
         </p:txBody>
@@ -10821,7 +10983,7 @@
           <a:p>
             <a:fld id="{F64C424B-C749-4819-BEAF-C73A3A7C174A}" type="datetime8">
               <a:rPr lang="en-US" smtClean="0"/>
-              <a:t>1/22/2018 2:50 PM</a:t>
+              <a:t>1/29/2018 11:47 AM</a:t>
             </a:fld>
             <a:endParaRPr lang="en-US" dirty="0"/>
           </a:p>
@@ -10925,6 +11087,62 @@
           <a:bodyPr/>
           <a:lstStyle/>
           <a:p>
+            <a:r>
+              <a:rPr lang="en-IE" dirty="0" smtClean="0"/>
+              <a:t>MAIN FOCUS HERE!!!</a:t>
+            </a:r>
+          </a:p>
+          <a:p>
+            <a:endParaRPr lang="en-IE" dirty="0" smtClean="0"/>
+          </a:p>
+          <a:p>
+            <a:r>
+              <a:rPr lang="en-IE" dirty="0" smtClean="0"/>
+              <a:t>Energy load forecasting</a:t>
+            </a:r>
+          </a:p>
+          <a:p>
+            <a:r>
+              <a:rPr lang="en-IE" dirty="0" smtClean="0"/>
+              <a:t>Workload interaction assessment in data centres</a:t>
+            </a:r>
+          </a:p>
+          <a:p>
+            <a:r>
+              <a:rPr lang="en-IE" dirty="0" smtClean="0"/>
+              <a:t>Anomaly detection in server behaviour</a:t>
+            </a:r>
+          </a:p>
+          <a:p>
+            <a:r>
+              <a:rPr lang="en-IE" dirty="0" smtClean="0"/>
+              <a:t>Intelligent agents in data centres (preventive maintenance, near-real-time corrective actions)</a:t>
+            </a:r>
+          </a:p>
+          <a:p>
+            <a:r>
+              <a:rPr lang="en-IE" dirty="0" smtClean="0"/>
+              <a:t>Call centre optimization (optimizer engine and feature extraction, repeat callers, </a:t>
+            </a:r>
+            <a:r>
+              <a:rPr lang="en-IE" dirty="0" err="1" smtClean="0"/>
+              <a:t>auth</a:t>
+            </a:r>
+            <a:r>
+              <a:rPr lang="en-IE" dirty="0" smtClean="0"/>
+              <a:t> rate, IVR optimization, Population segmentation)</a:t>
+            </a:r>
+          </a:p>
+          <a:p>
+            <a:r>
+              <a:rPr lang="en-IE" dirty="0" smtClean="0"/>
+              <a:t>Early diagnosis suggestions</a:t>
+            </a:r>
+          </a:p>
+          <a:p>
+            <a:endParaRPr lang="en-US" dirty="0" smtClean="0"/>
+          </a:p>
+          <a:p>
             <a:endParaRPr lang="en-US" dirty="0"/>
           </a:p>
         </p:txBody>
@@ -10989,7 +11207,7 @@
           <a:p>
             <a:fld id="{F64C424B-C749-4819-BEAF-C73A3A7C174A}" type="datetime8">
               <a:rPr lang="en-US" smtClean="0"/>
-              <a:t>1/22/2018 2:50 PM</a:t>
+              <a:t>1/29/2018 11:47 AM</a:t>
             </a:fld>
             <a:endParaRPr lang="en-US" dirty="0"/>
           </a:p>
@@ -11093,6 +11311,62 @@
           <a:bodyPr/>
           <a:lstStyle/>
           <a:p>
+            <a:r>
+              <a:rPr lang="en-IE" dirty="0" smtClean="0"/>
+              <a:t>MAIN FOCUS HERE!!!</a:t>
+            </a:r>
+          </a:p>
+          <a:p>
+            <a:endParaRPr lang="en-IE" dirty="0" smtClean="0"/>
+          </a:p>
+          <a:p>
+            <a:r>
+              <a:rPr lang="en-IE" dirty="0" smtClean="0"/>
+              <a:t>Energy load forecasting</a:t>
+            </a:r>
+          </a:p>
+          <a:p>
+            <a:r>
+              <a:rPr lang="en-IE" dirty="0" smtClean="0"/>
+              <a:t>Workload interaction assessment in data centres</a:t>
+            </a:r>
+          </a:p>
+          <a:p>
+            <a:r>
+              <a:rPr lang="en-IE" dirty="0" smtClean="0"/>
+              <a:t>Anomaly detection in server behaviour</a:t>
+            </a:r>
+          </a:p>
+          <a:p>
+            <a:r>
+              <a:rPr lang="en-IE" dirty="0" smtClean="0"/>
+              <a:t>Intelligent agents in data centres (preventive maintenance, near-real-time corrective actions)</a:t>
+            </a:r>
+          </a:p>
+          <a:p>
+            <a:r>
+              <a:rPr lang="en-IE" dirty="0" smtClean="0"/>
+              <a:t>Call centre optimization (optimizer engine and feature extraction, repeat callers, </a:t>
+            </a:r>
+            <a:r>
+              <a:rPr lang="en-IE" dirty="0" err="1" smtClean="0"/>
+              <a:t>auth</a:t>
+            </a:r>
+            <a:r>
+              <a:rPr lang="en-IE" dirty="0" smtClean="0"/>
+              <a:t> rate, IVR optimization, Population segmentation)</a:t>
+            </a:r>
+          </a:p>
+          <a:p>
+            <a:r>
+              <a:rPr lang="en-IE" dirty="0" smtClean="0"/>
+              <a:t>Early diagnosis suggestions</a:t>
+            </a:r>
+          </a:p>
+          <a:p>
+            <a:endParaRPr lang="en-US" dirty="0" smtClean="0"/>
+          </a:p>
+          <a:p>
             <a:endParaRPr lang="en-US" dirty="0"/>
           </a:p>
         </p:txBody>
@@ -11157,7 +11431,7 @@
           <a:p>
             <a:fld id="{F64C424B-C749-4819-BEAF-C73A3A7C174A}" type="datetime8">
               <a:rPr lang="en-US" smtClean="0"/>
-              <a:t>1/22/2018 2:50 PM</a:t>
+              <a:t>1/29/2018 1:38 PM</a:t>
             </a:fld>
             <a:endParaRPr lang="en-US" dirty="0"/>
           </a:p>
@@ -11358,7 +11632,7 @@
           <a:p>
             <a:fld id="{F23EEDA6-C444-400B-9265-AA145BEA4DAB}" type="datetime8">
               <a:rPr lang="en-US" smtClean="0"/>
-              <a:t>1/26/2018 1:26 PM</a:t>
+              <a:t>1/29/2018 11:47 AM</a:t>
             </a:fld>
             <a:endParaRPr lang="en-US" dirty="0"/>
           </a:p>
@@ -11392,6 +11666,510 @@
     <p:extLst>
       <p:ext uri="{BB962C8B-B14F-4D97-AF65-F5344CB8AC3E}">
         <p14:creationId xmlns:p14="http://schemas.microsoft.com/office/powerpoint/2010/main" val="573591069"/>
+      </p:ext>
+    </p:extLst>
+  </p:cSld>
+  <p:clrMapOvr>
+    <a:masterClrMapping/>
+  </p:clrMapOvr>
+</p:notes>
+</file>
+
+<file path=ppt/notesSlides/notesSlide20.xml><?xml version="1.0" encoding="utf-8"?>
+<p:notes xmlns:a="http://schemas.openxmlformats.org/drawingml/2006/main" xmlns:r="http://schemas.openxmlformats.org/officeDocument/2006/relationships" xmlns:p="http://schemas.openxmlformats.org/presentationml/2006/main">
+  <p:cSld>
+    <p:spTree>
+      <p:nvGrpSpPr>
+        <p:cNvPr id="1" name=""/>
+        <p:cNvGrpSpPr/>
+        <p:nvPr/>
+      </p:nvGrpSpPr>
+      <p:grpSpPr>
+        <a:xfrm>
+          <a:off x="0" y="0"/>
+          <a:ext cx="0" cy="0"/>
+          <a:chOff x="0" y="0"/>
+          <a:chExt cx="0" cy="0"/>
+        </a:xfrm>
+      </p:grpSpPr>
+      <p:sp>
+        <p:nvSpPr>
+          <p:cNvPr id="2" name="Slide Image Placeholder 1"/>
+          <p:cNvSpPr>
+            <a:spLocks noGrp="1" noRot="1" noChangeAspect="1"/>
+          </p:cNvSpPr>
+          <p:nvPr>
+            <p:ph type="sldImg"/>
+          </p:nvPr>
+        </p:nvSpPr>
+        <p:spPr>
+          <a:xfrm>
+            <a:off x="1143000" y="685800"/>
+            <a:ext cx="4572000" cy="3429000"/>
+          </a:xfrm>
+        </p:spPr>
+      </p:sp>
+      <p:sp>
+        <p:nvSpPr>
+          <p:cNvPr id="3" name="Notes Placeholder 2"/>
+          <p:cNvSpPr>
+            <a:spLocks noGrp="1"/>
+          </p:cNvSpPr>
+          <p:nvPr>
+            <p:ph type="body" idx="1"/>
+          </p:nvPr>
+        </p:nvSpPr>
+        <p:spPr/>
+        <p:txBody>
+          <a:bodyPr/>
+          <a:lstStyle/>
+          <a:p>
+            <a:endParaRPr lang="en-US" dirty="0"/>
+          </a:p>
+        </p:txBody>
+      </p:sp>
+      <p:sp>
+        <p:nvSpPr>
+          <p:cNvPr id="4" name="Header Placeholder 3"/>
+          <p:cNvSpPr>
+            <a:spLocks noGrp="1"/>
+          </p:cNvSpPr>
+          <p:nvPr>
+            <p:ph type="hdr" sz="quarter" idx="10"/>
+          </p:nvPr>
+        </p:nvSpPr>
+        <p:spPr/>
+        <p:txBody>
+          <a:bodyPr/>
+          <a:lstStyle/>
+          <a:p>
+            <a:endParaRPr lang="en-US" dirty="0"/>
+          </a:p>
+        </p:txBody>
+      </p:sp>
+      <p:sp>
+        <p:nvSpPr>
+          <p:cNvPr id="7" name="Slide Number Placeholder 6"/>
+          <p:cNvSpPr>
+            <a:spLocks noGrp="1"/>
+          </p:cNvSpPr>
+          <p:nvPr>
+            <p:ph type="sldNum" sz="quarter" idx="13"/>
+          </p:nvPr>
+        </p:nvSpPr>
+        <p:spPr/>
+        <p:txBody>
+          <a:bodyPr/>
+          <a:lstStyle/>
+          <a:p>
+            <a:fld id="{B4008EB6-D09E-4580-8CD6-DDB14511944F}" type="slidenum">
+              <a:rPr lang="en-US" smtClean="0"/>
+              <a:pPr/>
+              <a:t>22</a:t>
+            </a:fld>
+            <a:endParaRPr lang="en-US" dirty="0"/>
+          </a:p>
+        </p:txBody>
+      </p:sp>
+      <p:sp>
+        <p:nvSpPr>
+          <p:cNvPr id="8" name="Date Placeholder 7"/>
+          <p:cNvSpPr>
+            <a:spLocks noGrp="1"/>
+          </p:cNvSpPr>
+          <p:nvPr>
+            <p:ph type="dt" idx="14"/>
+          </p:nvPr>
+        </p:nvSpPr>
+        <p:spPr/>
+        <p:txBody>
+          <a:bodyPr/>
+          <a:lstStyle/>
+          <a:p>
+            <a:fld id="{F64C424B-C749-4819-BEAF-C73A3A7C174A}" type="datetime8">
+              <a:rPr lang="en-US" smtClean="0"/>
+              <a:t>1/29/2018 11:47 AM</a:t>
+            </a:fld>
+            <a:endParaRPr lang="en-US" dirty="0"/>
+          </a:p>
+        </p:txBody>
+      </p:sp>
+      <p:sp>
+        <p:nvSpPr>
+          <p:cNvPr id="9" name="Footer Placeholder 8"/>
+          <p:cNvSpPr>
+            <a:spLocks noGrp="1"/>
+          </p:cNvSpPr>
+          <p:nvPr>
+            <p:ph type="ftr" sz="quarter" idx="15"/>
+          </p:nvPr>
+        </p:nvSpPr>
+        <p:spPr/>
+        <p:txBody>
+          <a:bodyPr/>
+          <a:lstStyle/>
+          <a:p>
+            <a:pPr defTabSz="932290" eaLnBrk="0" hangingPunct="0"/>
+            <a:r>
+              <a:rPr lang="en-US" sz="500" dirty="0">
+                <a:gradFill>
+                  <a:gsLst>
+                    <a:gs pos="0">
+                      <a:schemeClr val="tx1"/>
+                    </a:gs>
+                    <a:gs pos="100000">
+                      <a:schemeClr val="tx1"/>
+                    </a:gs>
+                  </a:gsLst>
+                  <a:lin ang="5400000" scaled="0"/>
+                </a:gradFill>
+                <a:cs typeface="Arial" panose="020B0604020202020204" pitchFamily="34" charset="0"/>
+              </a:rPr>
+              <a:t>© 2016 Optum, Inc. All rights reserved. </a:t>
+            </a:r>
+          </a:p>
+        </p:txBody>
+      </p:sp>
+    </p:spTree>
+    <p:extLst>
+      <p:ext uri="{BB962C8B-B14F-4D97-AF65-F5344CB8AC3E}">
+        <p14:creationId xmlns:p14="http://schemas.microsoft.com/office/powerpoint/2010/main" val="439873543"/>
+      </p:ext>
+    </p:extLst>
+  </p:cSld>
+  <p:clrMapOvr>
+    <a:masterClrMapping/>
+  </p:clrMapOvr>
+</p:notes>
+</file>
+
+<file path=ppt/notesSlides/notesSlide21.xml><?xml version="1.0" encoding="utf-8"?>
+<p:notes xmlns:a="http://schemas.openxmlformats.org/drawingml/2006/main" xmlns:r="http://schemas.openxmlformats.org/officeDocument/2006/relationships" xmlns:p="http://schemas.openxmlformats.org/presentationml/2006/main">
+  <p:cSld>
+    <p:spTree>
+      <p:nvGrpSpPr>
+        <p:cNvPr id="1" name=""/>
+        <p:cNvGrpSpPr/>
+        <p:nvPr/>
+      </p:nvGrpSpPr>
+      <p:grpSpPr>
+        <a:xfrm>
+          <a:off x="0" y="0"/>
+          <a:ext cx="0" cy="0"/>
+          <a:chOff x="0" y="0"/>
+          <a:chExt cx="0" cy="0"/>
+        </a:xfrm>
+      </p:grpSpPr>
+      <p:sp>
+        <p:nvSpPr>
+          <p:cNvPr id="2" name="Slide Image Placeholder 1"/>
+          <p:cNvSpPr>
+            <a:spLocks noGrp="1" noRot="1" noChangeAspect="1"/>
+          </p:cNvSpPr>
+          <p:nvPr>
+            <p:ph type="sldImg"/>
+          </p:nvPr>
+        </p:nvSpPr>
+        <p:spPr>
+          <a:xfrm>
+            <a:off x="1143000" y="685800"/>
+            <a:ext cx="4572000" cy="3429000"/>
+          </a:xfrm>
+        </p:spPr>
+      </p:sp>
+      <p:sp>
+        <p:nvSpPr>
+          <p:cNvPr id="3" name="Notes Placeholder 2"/>
+          <p:cNvSpPr>
+            <a:spLocks noGrp="1"/>
+          </p:cNvSpPr>
+          <p:nvPr>
+            <p:ph type="body" idx="1"/>
+          </p:nvPr>
+        </p:nvSpPr>
+        <p:spPr/>
+        <p:txBody>
+          <a:bodyPr/>
+          <a:lstStyle/>
+          <a:p>
+            <a:endParaRPr lang="en-US" dirty="0"/>
+          </a:p>
+        </p:txBody>
+      </p:sp>
+      <p:sp>
+        <p:nvSpPr>
+          <p:cNvPr id="4" name="Header Placeholder 3"/>
+          <p:cNvSpPr>
+            <a:spLocks noGrp="1"/>
+          </p:cNvSpPr>
+          <p:nvPr>
+            <p:ph type="hdr" sz="quarter" idx="10"/>
+          </p:nvPr>
+        </p:nvSpPr>
+        <p:spPr/>
+        <p:txBody>
+          <a:bodyPr/>
+          <a:lstStyle/>
+          <a:p>
+            <a:endParaRPr lang="en-US" dirty="0"/>
+          </a:p>
+        </p:txBody>
+      </p:sp>
+      <p:sp>
+        <p:nvSpPr>
+          <p:cNvPr id="7" name="Slide Number Placeholder 6"/>
+          <p:cNvSpPr>
+            <a:spLocks noGrp="1"/>
+          </p:cNvSpPr>
+          <p:nvPr>
+            <p:ph type="sldNum" sz="quarter" idx="13"/>
+          </p:nvPr>
+        </p:nvSpPr>
+        <p:spPr/>
+        <p:txBody>
+          <a:bodyPr/>
+          <a:lstStyle/>
+          <a:p>
+            <a:fld id="{B4008EB6-D09E-4580-8CD6-DDB14511944F}" type="slidenum">
+              <a:rPr lang="en-US" smtClean="0"/>
+              <a:pPr/>
+              <a:t>23</a:t>
+            </a:fld>
+            <a:endParaRPr lang="en-US" dirty="0"/>
+          </a:p>
+        </p:txBody>
+      </p:sp>
+      <p:sp>
+        <p:nvSpPr>
+          <p:cNvPr id="8" name="Date Placeholder 7"/>
+          <p:cNvSpPr>
+            <a:spLocks noGrp="1"/>
+          </p:cNvSpPr>
+          <p:nvPr>
+            <p:ph type="dt" idx="14"/>
+          </p:nvPr>
+        </p:nvSpPr>
+        <p:spPr/>
+        <p:txBody>
+          <a:bodyPr/>
+          <a:lstStyle/>
+          <a:p>
+            <a:fld id="{F64C424B-C749-4819-BEAF-C73A3A7C174A}" type="datetime8">
+              <a:rPr lang="en-US" smtClean="0"/>
+              <a:t>1/29/2018 11:47 AM</a:t>
+            </a:fld>
+            <a:endParaRPr lang="en-US" dirty="0"/>
+          </a:p>
+        </p:txBody>
+      </p:sp>
+      <p:sp>
+        <p:nvSpPr>
+          <p:cNvPr id="9" name="Footer Placeholder 8"/>
+          <p:cNvSpPr>
+            <a:spLocks noGrp="1"/>
+          </p:cNvSpPr>
+          <p:nvPr>
+            <p:ph type="ftr" sz="quarter" idx="15"/>
+          </p:nvPr>
+        </p:nvSpPr>
+        <p:spPr/>
+        <p:txBody>
+          <a:bodyPr/>
+          <a:lstStyle/>
+          <a:p>
+            <a:pPr defTabSz="932290" eaLnBrk="0" hangingPunct="0"/>
+            <a:r>
+              <a:rPr lang="en-US" sz="500" dirty="0">
+                <a:gradFill>
+                  <a:gsLst>
+                    <a:gs pos="0">
+                      <a:schemeClr val="tx1"/>
+                    </a:gs>
+                    <a:gs pos="100000">
+                      <a:schemeClr val="tx1"/>
+                    </a:gs>
+                  </a:gsLst>
+                  <a:lin ang="5400000" scaled="0"/>
+                </a:gradFill>
+                <a:cs typeface="Arial" panose="020B0604020202020204" pitchFamily="34" charset="0"/>
+              </a:rPr>
+              <a:t>© 2016 Optum, Inc. All rights reserved. </a:t>
+            </a:r>
+          </a:p>
+        </p:txBody>
+      </p:sp>
+    </p:spTree>
+    <p:extLst>
+      <p:ext uri="{BB962C8B-B14F-4D97-AF65-F5344CB8AC3E}">
+        <p14:creationId xmlns:p14="http://schemas.microsoft.com/office/powerpoint/2010/main" val="439873543"/>
+      </p:ext>
+    </p:extLst>
+  </p:cSld>
+  <p:clrMapOvr>
+    <a:masterClrMapping/>
+  </p:clrMapOvr>
+</p:notes>
+</file>
+
+<file path=ppt/notesSlides/notesSlide22.xml><?xml version="1.0" encoding="utf-8"?>
+<p:notes xmlns:a="http://schemas.openxmlformats.org/drawingml/2006/main" xmlns:r="http://schemas.openxmlformats.org/officeDocument/2006/relationships" xmlns:p="http://schemas.openxmlformats.org/presentationml/2006/main">
+  <p:cSld>
+    <p:spTree>
+      <p:nvGrpSpPr>
+        <p:cNvPr id="1" name=""/>
+        <p:cNvGrpSpPr/>
+        <p:nvPr/>
+      </p:nvGrpSpPr>
+      <p:grpSpPr>
+        <a:xfrm>
+          <a:off x="0" y="0"/>
+          <a:ext cx="0" cy="0"/>
+          <a:chOff x="0" y="0"/>
+          <a:chExt cx="0" cy="0"/>
+        </a:xfrm>
+      </p:grpSpPr>
+      <p:sp>
+        <p:nvSpPr>
+          <p:cNvPr id="2" name="Slide Image Placeholder 1"/>
+          <p:cNvSpPr>
+            <a:spLocks noGrp="1" noRot="1" noChangeAspect="1"/>
+          </p:cNvSpPr>
+          <p:nvPr>
+            <p:ph type="sldImg"/>
+          </p:nvPr>
+        </p:nvSpPr>
+        <p:spPr>
+          <a:xfrm>
+            <a:off x="1143000" y="685800"/>
+            <a:ext cx="4572000" cy="3429000"/>
+          </a:xfrm>
+        </p:spPr>
+      </p:sp>
+      <p:sp>
+        <p:nvSpPr>
+          <p:cNvPr id="3" name="Notes Placeholder 2"/>
+          <p:cNvSpPr>
+            <a:spLocks noGrp="1"/>
+          </p:cNvSpPr>
+          <p:nvPr>
+            <p:ph type="body" idx="1"/>
+          </p:nvPr>
+        </p:nvSpPr>
+        <p:spPr/>
+        <p:txBody>
+          <a:bodyPr/>
+          <a:lstStyle/>
+          <a:p>
+            <a:endParaRPr lang="en-US" dirty="0"/>
+          </a:p>
+        </p:txBody>
+      </p:sp>
+      <p:sp>
+        <p:nvSpPr>
+          <p:cNvPr id="4" name="Header Placeholder 3"/>
+          <p:cNvSpPr>
+            <a:spLocks noGrp="1"/>
+          </p:cNvSpPr>
+          <p:nvPr>
+            <p:ph type="hdr" sz="quarter" idx="10"/>
+          </p:nvPr>
+        </p:nvSpPr>
+        <p:spPr/>
+        <p:txBody>
+          <a:bodyPr/>
+          <a:lstStyle/>
+          <a:p>
+            <a:endParaRPr lang="en-US" dirty="0"/>
+          </a:p>
+        </p:txBody>
+      </p:sp>
+      <p:sp>
+        <p:nvSpPr>
+          <p:cNvPr id="7" name="Slide Number Placeholder 6"/>
+          <p:cNvSpPr>
+            <a:spLocks noGrp="1"/>
+          </p:cNvSpPr>
+          <p:nvPr>
+            <p:ph type="sldNum" sz="quarter" idx="13"/>
+          </p:nvPr>
+        </p:nvSpPr>
+        <p:spPr/>
+        <p:txBody>
+          <a:bodyPr/>
+          <a:lstStyle/>
+          <a:p>
+            <a:fld id="{B4008EB6-D09E-4580-8CD6-DDB14511944F}" type="slidenum">
+              <a:rPr lang="en-US" smtClean="0"/>
+              <a:pPr/>
+              <a:t>24</a:t>
+            </a:fld>
+            <a:endParaRPr lang="en-US" dirty="0"/>
+          </a:p>
+        </p:txBody>
+      </p:sp>
+      <p:sp>
+        <p:nvSpPr>
+          <p:cNvPr id="8" name="Date Placeholder 7"/>
+          <p:cNvSpPr>
+            <a:spLocks noGrp="1"/>
+          </p:cNvSpPr>
+          <p:nvPr>
+            <p:ph type="dt" idx="14"/>
+          </p:nvPr>
+        </p:nvSpPr>
+        <p:spPr/>
+        <p:txBody>
+          <a:bodyPr/>
+          <a:lstStyle/>
+          <a:p>
+            <a:fld id="{F64C424B-C749-4819-BEAF-C73A3A7C174A}" type="datetime8">
+              <a:rPr lang="en-US" smtClean="0"/>
+              <a:t>1/29/2018 11:47 AM</a:t>
+            </a:fld>
+            <a:endParaRPr lang="en-US" dirty="0"/>
+          </a:p>
+        </p:txBody>
+      </p:sp>
+      <p:sp>
+        <p:nvSpPr>
+          <p:cNvPr id="9" name="Footer Placeholder 8"/>
+          <p:cNvSpPr>
+            <a:spLocks noGrp="1"/>
+          </p:cNvSpPr>
+          <p:nvPr>
+            <p:ph type="ftr" sz="quarter" idx="15"/>
+          </p:nvPr>
+        </p:nvSpPr>
+        <p:spPr/>
+        <p:txBody>
+          <a:bodyPr/>
+          <a:lstStyle/>
+          <a:p>
+            <a:pPr defTabSz="932290" eaLnBrk="0" hangingPunct="0"/>
+            <a:r>
+              <a:rPr lang="en-US" sz="500" dirty="0">
+                <a:gradFill>
+                  <a:gsLst>
+                    <a:gs pos="0">
+                      <a:schemeClr val="tx1"/>
+                    </a:gs>
+                    <a:gs pos="100000">
+                      <a:schemeClr val="tx1"/>
+                    </a:gs>
+                  </a:gsLst>
+                  <a:lin ang="5400000" scaled="0"/>
+                </a:gradFill>
+                <a:cs typeface="Arial" panose="020B0604020202020204" pitchFamily="34" charset="0"/>
+              </a:rPr>
+              <a:t>© 2016 Optum, Inc. All rights reserved. </a:t>
+            </a:r>
+          </a:p>
+        </p:txBody>
+      </p:sp>
+    </p:spTree>
+    <p:extLst>
+      <p:ext uri="{BB962C8B-B14F-4D97-AF65-F5344CB8AC3E}">
+        <p14:creationId xmlns:p14="http://schemas.microsoft.com/office/powerpoint/2010/main" val="439873543"/>
       </p:ext>
     </p:extLst>
   </p:cSld>
@@ -11558,7 +12336,7 @@
           <a:p>
             <a:fld id="{F23EEDA6-C444-400B-9265-AA145BEA4DAB}" type="datetime8">
               <a:rPr lang="en-US" smtClean="0"/>
-              <a:t>1/22/2018 2:50 PM</a:t>
+              <a:t>1/29/2018 11:47 AM</a:t>
             </a:fld>
             <a:endParaRPr lang="en-US" dirty="0"/>
           </a:p>
@@ -11751,7 +12529,7 @@
           <a:p>
             <a:fld id="{F64C424B-C749-4819-BEAF-C73A3A7C174A}" type="datetime8">
               <a:rPr lang="en-US" smtClean="0"/>
-              <a:t>1/22/2018 2:50 PM</a:t>
+              <a:t>1/29/2018 11:47 AM</a:t>
             </a:fld>
             <a:endParaRPr lang="en-US" dirty="0"/>
           </a:p>
@@ -11936,7 +12714,7 @@
           <a:p>
             <a:fld id="{F64C424B-C749-4819-BEAF-C73A3A7C174A}" type="datetime8">
               <a:rPr lang="en-US" smtClean="0"/>
-              <a:t>1/22/2018 2:50 PM</a:t>
+              <a:t>1/29/2018 11:47 AM</a:t>
             </a:fld>
             <a:endParaRPr lang="en-US" dirty="0"/>
           </a:p>
@@ -12124,7 +12902,7 @@
           <a:p>
             <a:fld id="{F64C424B-C749-4819-BEAF-C73A3A7C174A}" type="datetime8">
               <a:rPr lang="en-US" smtClean="0"/>
-              <a:t>1/22/2018 2:50 PM</a:t>
+              <a:t>1/29/2018 11:47 AM</a:t>
             </a:fld>
             <a:endParaRPr lang="en-US" dirty="0"/>
           </a:p>
@@ -12238,7 +13016,77 @@
             </a:r>
             <a:r>
               <a:rPr lang="en-IE" dirty="0" smtClean="0"/>
-              <a:t>Data science is multidisciplinary.</a:t>
+              <a:t>Data science is </a:t>
+            </a:r>
+            <a:r>
+              <a:rPr lang="en-IE" dirty="0" err="1" smtClean="0"/>
+              <a:t>multidiscip</a:t>
+            </a:r>
+            <a:endParaRPr lang="en-IE" dirty="0" smtClean="0"/>
+          </a:p>
+          <a:p>
+            <a:r>
+              <a:rPr lang="en-IE" dirty="0" smtClean="0"/>
+              <a:t>Skills needed by data scientists:</a:t>
+            </a:r>
+          </a:p>
+          <a:p>
+            <a:r>
+              <a:rPr lang="en-IE" dirty="0" smtClean="0"/>
+              <a:t>LOTS of different skills. One cannot hope to know them all: TEAMS!!!</a:t>
+            </a:r>
+          </a:p>
+          <a:p>
+            <a:endParaRPr lang="en-IE" dirty="0" smtClean="0"/>
+          </a:p>
+          <a:p>
+            <a:r>
+              <a:rPr lang="en-IE" dirty="0" smtClean="0"/>
+              <a:t>Maths, statistics,</a:t>
+            </a:r>
+            <a:r>
+              <a:rPr lang="en-IE" baseline="0" dirty="0" smtClean="0"/>
+              <a:t> </a:t>
+            </a:r>
+            <a:r>
+              <a:rPr lang="en-IE" baseline="0" dirty="0" err="1" smtClean="0"/>
+              <a:t>modeling</a:t>
+            </a:r>
+            <a:r>
+              <a:rPr lang="en-IE" baseline="0" dirty="0" smtClean="0"/>
+              <a:t>, experimental design, Bayesian analysis, ML, Optimization, Software development, CS,</a:t>
+            </a:r>
+          </a:p>
+          <a:p>
+            <a:r>
+              <a:rPr lang="en-IE" baseline="0" dirty="0" smtClean="0"/>
+              <a:t>Scripting, databases (SQL + NoSQL), Linear Algebra, M/R, Big Data tools, AWS, Business acumen, strategy, product management, </a:t>
+            </a:r>
+          </a:p>
+          <a:p>
+            <a:r>
+              <a:rPr lang="en-IE" baseline="0" dirty="0" smtClean="0"/>
+              <a:t>Problem solving, communication with stakeholders, senior management interface, Visualization, Story telling</a:t>
+            </a:r>
+            <a:endParaRPr lang="en-US" dirty="0" smtClean="0"/>
+          </a:p>
+          <a:p>
+            <a:endParaRPr lang="en-IE" dirty="0" smtClean="0"/>
+          </a:p>
+          <a:p>
+            <a:endParaRPr lang="en-IE" dirty="0" smtClean="0"/>
+          </a:p>
+          <a:p>
+            <a:endParaRPr lang="en-US" dirty="0" smtClean="0"/>
+          </a:p>
+          <a:p>
+            <a:r>
+              <a:rPr lang="en-IE" dirty="0" err="1" smtClean="0"/>
+              <a:t>linary</a:t>
+            </a:r>
+            <a:r>
+              <a:rPr lang="en-IE" dirty="0" smtClean="0"/>
+              <a:t>.</a:t>
             </a:r>
             <a:endParaRPr lang="en-US" dirty="0"/>
           </a:p>
@@ -12304,7 +13152,7 @@
           <a:p>
             <a:fld id="{F64C424B-C749-4819-BEAF-C73A3A7C174A}" type="datetime8">
               <a:rPr lang="en-US" smtClean="0"/>
-              <a:t>1/22/2018 2:50 PM</a:t>
+              <a:t>1/29/2018 2:06 PM</a:t>
             </a:fld>
             <a:endParaRPr lang="en-US" dirty="0"/>
           </a:p>
@@ -12486,7 +13334,7 @@
           <a:p>
             <a:fld id="{F64C424B-C749-4819-BEAF-C73A3A7C174A}" type="datetime8">
               <a:rPr lang="en-US" smtClean="0"/>
-              <a:t>1/22/2018 2:50 PM</a:t>
+              <a:t>1/29/2018 11:47 AM</a:t>
             </a:fld>
             <a:endParaRPr lang="en-US" dirty="0"/>
           </a:p>
@@ -12730,7 +13578,7 @@
           <a:p>
             <a:fld id="{F64C424B-C749-4819-BEAF-C73A3A7C174A}" type="datetime8">
               <a:rPr lang="en-US" smtClean="0"/>
-              <a:t>1/22/2018 2:50 PM</a:t>
+              <a:t>1/29/2018 11:47 AM</a:t>
             </a:fld>
             <a:endParaRPr lang="en-US" dirty="0"/>
           </a:p>
@@ -16611,7 +17459,15 @@
           <a:p>
             <a:r>
               <a:rPr lang="en-US" sz="1400" dirty="0" smtClean="0"/>
-              <a:t>Pietro Mascolo | 13.02.2018</a:t>
+              <a:t>Pietro </a:t>
+            </a:r>
+            <a:r>
+              <a:rPr lang="en-US" sz="1400" dirty="0" smtClean="0"/>
+              <a:t>Mascolo </a:t>
+            </a:r>
+            <a:r>
+              <a:rPr lang="en-US" sz="1400" dirty="0" smtClean="0"/>
+              <a:t>| 13.02.2018</a:t>
             </a:r>
           </a:p>
         </p:txBody>
@@ -17493,130 +18349,6 @@
             <p:ph type="title"/>
           </p:nvPr>
         </p:nvSpPr>
-        <p:spPr/>
-        <p:txBody>
-          <a:bodyPr/>
-          <a:lstStyle/>
-          <a:p>
-            <a:r>
-              <a:rPr lang="en-US" dirty="0" smtClean="0"/>
-              <a:t>Data Scientists </a:t>
-            </a:r>
-            <a:r>
-              <a:rPr lang="en-US" dirty="0" smtClean="0"/>
-              <a:t>– Who / Skills</a:t>
-            </a:r>
-            <a:endParaRPr lang="en-US" dirty="0"/>
-          </a:p>
-        </p:txBody>
-      </p:sp>
-      <p:pic>
-        <p:nvPicPr>
-          <p:cNvPr id="3" name="Picture 2"/>
-          <p:cNvPicPr>
-            <a:picLocks noChangeAspect="1"/>
-          </p:cNvPicPr>
-          <p:nvPr/>
-        </p:nvPicPr>
-        <p:blipFill rotWithShape="1">
-          <a:blip r:embed="rId3">
-            <a:extLst>
-              <a:ext uri="{28A0092B-C50C-407E-A947-70E740481C1C}">
-                <a14:useLocalDpi xmlns:a14="http://schemas.microsoft.com/office/drawing/2010/main" val="0"/>
-              </a:ext>
-            </a:extLst>
-          </a:blip>
-          <a:srcRect t="23688" b="3972"/>
-          <a:stretch/>
-        </p:blipFill>
-        <p:spPr>
-          <a:xfrm>
-            <a:off x="1841533" y="1521382"/>
-            <a:ext cx="5483393" cy="5282637"/>
-          </a:xfrm>
-          <a:prstGeom prst="rect">
-            <a:avLst/>
-          </a:prstGeom>
-        </p:spPr>
-      </p:pic>
-    </p:spTree>
-    <p:extLst>
-      <p:ext uri="{BB962C8B-B14F-4D97-AF65-F5344CB8AC3E}">
-        <p14:creationId xmlns:p14="http://schemas.microsoft.com/office/powerpoint/2010/main" val="2741091380"/>
-      </p:ext>
-    </p:extLst>
-  </p:cSld>
-  <p:clrMapOvr>
-    <a:masterClrMapping/>
-  </p:clrMapOvr>
-  <mc:AlternateContent xmlns:mc="http://schemas.openxmlformats.org/markup-compatibility/2006" xmlns:p14="http://schemas.microsoft.com/office/powerpoint/2010/main">
-    <mc:Choice Requires="p14">
-      <p:transition spd="med" p14:dur="700">
-        <p:fade/>
-      </p:transition>
-    </mc:Choice>
-    <mc:Fallback xmlns="">
-      <p:transition spd="med">
-        <p:fade/>
-      </p:transition>
-    </mc:Fallback>
-  </mc:AlternateContent>
-  <p:timing>
-    <p:tnLst>
-      <p:par>
-        <p:cTn id="1" dur="indefinite" restart="never" nodeType="tmRoot"/>
-      </p:par>
-    </p:tnLst>
-  </p:timing>
-</p:sld>
-</file>
-
-<file path=ppt/slides/slide13.xml><?xml version="1.0" encoding="utf-8"?>
-<p:sld xmlns:a="http://schemas.openxmlformats.org/drawingml/2006/main" xmlns:r="http://schemas.openxmlformats.org/officeDocument/2006/relationships" xmlns:p="http://schemas.openxmlformats.org/presentationml/2006/main">
-  <p:cSld>
-    <p:spTree>
-      <p:nvGrpSpPr>
-        <p:cNvPr id="1" name=""/>
-        <p:cNvGrpSpPr/>
-        <p:nvPr/>
-      </p:nvGrpSpPr>
-      <p:grpSpPr>
-        <a:xfrm>
-          <a:off x="0" y="0"/>
-          <a:ext cx="0" cy="0"/>
-          <a:chOff x="0" y="0"/>
-          <a:chExt cx="0" cy="0"/>
-        </a:xfrm>
-      </p:grpSpPr>
-      <p:sp>
-        <p:nvSpPr>
-          <p:cNvPr id="2" name="Text Placeholder 1"/>
-          <p:cNvSpPr>
-            <a:spLocks noGrp="1"/>
-          </p:cNvSpPr>
-          <p:nvPr>
-            <p:ph type="body" sz="quarter" idx="13"/>
-          </p:nvPr>
-        </p:nvSpPr>
-        <p:spPr/>
-        <p:txBody>
-          <a:bodyPr/>
-          <a:lstStyle/>
-          <a:p>
-            <a:endParaRPr lang="en-US" dirty="0"/>
-          </a:p>
-        </p:txBody>
-      </p:sp>
-      <p:sp>
-        <p:nvSpPr>
-          <p:cNvPr id="17" name="Title 16"/>
-          <p:cNvSpPr>
-            <a:spLocks noGrp="1"/>
-          </p:cNvSpPr>
-          <p:nvPr>
-            <p:ph type="title"/>
-          </p:nvPr>
-        </p:nvSpPr>
         <p:spPr>
           <a:xfrm>
             <a:off x="461387" y="297181"/>
@@ -17743,7 +18475,7 @@
 </p:sld>
 </file>
 
-<file path=ppt/slides/slide14.xml><?xml version="1.0" encoding="utf-8"?>
+<file path=ppt/slides/slide13.xml><?xml version="1.0" encoding="utf-8"?>
 <p:sld xmlns:a="http://schemas.openxmlformats.org/drawingml/2006/main" xmlns:r="http://schemas.openxmlformats.org/officeDocument/2006/relationships" xmlns:p="http://schemas.openxmlformats.org/presentationml/2006/main">
   <p:cSld>
     <p:spTree>
@@ -17816,14 +18548,14 @@
           <p:nvPr>
             <p:extLst>
               <p:ext uri="{D42A27DB-BD31-4B8C-83A1-F6EECF244321}">
-                <p14:modId xmlns:p14="http://schemas.microsoft.com/office/powerpoint/2010/main" val="3538681330"/>
+                <p14:modId xmlns:p14="http://schemas.microsoft.com/office/powerpoint/2010/main" val="1519082556"/>
               </p:ext>
             </p:extLst>
           </p:nvPr>
         </p:nvGraphicFramePr>
         <p:xfrm>
-          <a:off x="515567" y="1488331"/>
-          <a:ext cx="8365785" cy="4589770"/>
+          <a:off x="515567" y="1462804"/>
+          <a:ext cx="8365785" cy="4331605"/>
         </p:xfrm>
         <a:graphic>
           <a:graphicData uri="http://schemas.openxmlformats.org/drawingml/2006/table">
@@ -17880,21 +18612,21 @@
                   <a:tcPr/>
                 </a:tc>
               </a:tr>
-              <a:tr h="733407">
+              <a:tr h="590257">
                 <a:tc>
                   <a:txBody>
                     <a:bodyPr/>
                     <a:lstStyle/>
                     <a:p>
                       <a:r>
-                        <a:rPr lang="en-IE" dirty="0" smtClean="0"/>
+                        <a:rPr lang="en-IE" sz="1600" dirty="0" smtClean="0"/>
                         <a:t>Entertainment</a:t>
                       </a:r>
                       <a:r>
-                        <a:rPr lang="en-IE" baseline="0" dirty="0" smtClean="0"/>
+                        <a:rPr lang="en-IE" sz="1600" baseline="0" dirty="0" smtClean="0"/>
                         <a:t> / Social</a:t>
                       </a:r>
-                      <a:endParaRPr lang="en-US" dirty="0"/>
+                      <a:endParaRPr lang="en-US" sz="1600" dirty="0"/>
                     </a:p>
                   </a:txBody>
                   <a:tcPr/>
@@ -17905,14 +18637,14 @@
                     <a:lstStyle/>
                     <a:p>
                       <a:r>
-                        <a:rPr lang="en-IE" dirty="0" smtClean="0"/>
+                        <a:rPr lang="en-IE" sz="1600" dirty="0" smtClean="0"/>
                         <a:t>Recommend products</a:t>
                       </a:r>
                       <a:r>
-                        <a:rPr lang="en-IE" baseline="0" dirty="0" smtClean="0"/>
+                        <a:rPr lang="en-IE" sz="1600" baseline="0" dirty="0" smtClean="0"/>
                         <a:t> / contacts</a:t>
                       </a:r>
-                      <a:endParaRPr lang="en-US" dirty="0"/>
+                      <a:endParaRPr lang="en-US" sz="1600" dirty="0"/>
                     </a:p>
                   </a:txBody>
                   <a:tcPr/>
@@ -17923,30 +18655,30 @@
                     <a:lstStyle/>
                     <a:p>
                       <a:r>
-                        <a:rPr lang="en-IE" dirty="0" smtClean="0"/>
+                        <a:rPr lang="en-IE" sz="1600" dirty="0" smtClean="0"/>
                         <a:t>Amazon, Netflix, Facebook, </a:t>
                       </a:r>
                       <a:r>
-                        <a:rPr lang="en-IE" dirty="0" err="1" smtClean="0"/>
+                        <a:rPr lang="en-IE" sz="1600" dirty="0" err="1" smtClean="0"/>
                         <a:t>Linkedin</a:t>
                       </a:r>
-                      <a:endParaRPr lang="en-US" dirty="0"/>
+                      <a:endParaRPr lang="en-US" sz="1600" dirty="0"/>
                     </a:p>
                   </a:txBody>
                   <a:tcPr/>
                 </a:tc>
               </a:tr>
-              <a:tr h="513656">
+              <a:tr h="365760">
                 <a:tc>
                   <a:txBody>
                     <a:bodyPr/>
                     <a:lstStyle/>
                     <a:p>
                       <a:r>
-                        <a:rPr lang="en-IE" dirty="0" smtClean="0"/>
+                        <a:rPr lang="en-IE" sz="1600" dirty="0" smtClean="0"/>
                         <a:t>Search Engine Ranking</a:t>
                       </a:r>
-                      <a:endParaRPr lang="en-US" dirty="0"/>
+                      <a:endParaRPr lang="en-US" sz="1600" dirty="0"/>
                     </a:p>
                   </a:txBody>
                   <a:tcPr/>
@@ -17957,10 +18689,10 @@
                     <a:lstStyle/>
                     <a:p>
                       <a:r>
-                        <a:rPr lang="en-IE" dirty="0" smtClean="0"/>
+                        <a:rPr lang="en-IE" sz="1600" dirty="0" smtClean="0"/>
                         <a:t>Rank elements</a:t>
                       </a:r>
-                      <a:endParaRPr lang="en-US" dirty="0"/>
+                      <a:endParaRPr lang="en-US" sz="1600" dirty="0"/>
                     </a:p>
                   </a:txBody>
                   <a:tcPr/>
@@ -17971,34 +18703,34 @@
                     <a:lstStyle/>
                     <a:p>
                       <a:r>
-                        <a:rPr lang="en-IE" dirty="0" smtClean="0"/>
+                        <a:rPr lang="en-IE" sz="1600" dirty="0" smtClean="0"/>
                         <a:t>Google </a:t>
                       </a:r>
                       <a:r>
-                        <a:rPr lang="en-IE" dirty="0" err="1" smtClean="0"/>
+                        <a:rPr lang="en-IE" sz="1600" dirty="0" err="1" smtClean="0"/>
                         <a:t>Pagerank</a:t>
                       </a:r>
-                      <a:endParaRPr lang="en-US" dirty="0"/>
+                      <a:endParaRPr lang="en-US" sz="1600" dirty="0"/>
                     </a:p>
                   </a:txBody>
                   <a:tcPr/>
                 </a:tc>
               </a:tr>
-              <a:tr h="496017">
+              <a:tr h="413886">
                 <a:tc>
                   <a:txBody>
                     <a:bodyPr/>
                     <a:lstStyle/>
                     <a:p>
                       <a:r>
-                        <a:rPr lang="en-IE" dirty="0" smtClean="0"/>
+                        <a:rPr lang="en-IE" sz="1600" dirty="0" smtClean="0"/>
                         <a:t>Banking</a:t>
                       </a:r>
                       <a:r>
-                        <a:rPr lang="en-IE" baseline="0" dirty="0" smtClean="0"/>
+                        <a:rPr lang="en-IE" sz="1600" baseline="0" dirty="0" smtClean="0"/>
                         <a:t> / insurance</a:t>
                       </a:r>
-                      <a:endParaRPr lang="en-US" dirty="0"/>
+                      <a:endParaRPr lang="en-US" sz="1600" dirty="0"/>
                     </a:p>
                   </a:txBody>
                   <a:tcPr/>
@@ -18009,10 +18741,10 @@
                     <a:lstStyle/>
                     <a:p>
                       <a:r>
-                        <a:rPr lang="en-IE" dirty="0" smtClean="0"/>
+                        <a:rPr lang="en-IE" sz="1600" dirty="0" smtClean="0"/>
                         <a:t>Fraud detection</a:t>
                       </a:r>
-                      <a:endParaRPr lang="en-US" dirty="0"/>
+                      <a:endParaRPr lang="en-US" sz="1600" dirty="0"/>
                     </a:p>
                   </a:txBody>
                   <a:tcPr/>
@@ -18023,38 +18755,38 @@
                     <a:lstStyle/>
                     <a:p>
                       <a:r>
-                        <a:rPr lang="en-IE" dirty="0" smtClean="0"/>
+                        <a:rPr lang="en-IE" sz="1600" dirty="0" smtClean="0"/>
                         <a:t>UHG </a:t>
                       </a:r>
                       <a:r>
-                        <a:rPr lang="en-IE" dirty="0" smtClean="0">
+                        <a:rPr lang="en-IE" sz="1600" dirty="0" smtClean="0">
                           <a:sym typeface="Wingdings" panose="05000000000000000000" pitchFamily="2" charset="2"/>
                         </a:rPr>
                         <a:t>, any</a:t>
                       </a:r>
                       <a:r>
-                        <a:rPr lang="en-IE" baseline="0" dirty="0" smtClean="0">
+                        <a:rPr lang="en-IE" sz="1600" baseline="0" dirty="0" smtClean="0">
                           <a:sym typeface="Wingdings" panose="05000000000000000000" pitchFamily="2" charset="2"/>
                         </a:rPr>
                         <a:t> bank…</a:t>
                       </a:r>
-                      <a:endParaRPr lang="en-US" dirty="0"/>
+                      <a:endParaRPr lang="en-US" sz="1600" dirty="0"/>
                     </a:p>
                   </a:txBody>
                   <a:tcPr/>
                 </a:tc>
               </a:tr>
-              <a:tr h="496017">
+              <a:tr h="558265">
                 <a:tc>
                   <a:txBody>
                     <a:bodyPr/>
                     <a:lstStyle/>
                     <a:p>
                       <a:r>
-                        <a:rPr lang="en-IE" dirty="0" smtClean="0"/>
+                        <a:rPr lang="en-IE" sz="1600" dirty="0" smtClean="0"/>
                         <a:t>Banking</a:t>
                       </a:r>
-                      <a:endParaRPr lang="en-US" dirty="0"/>
+                      <a:endParaRPr lang="en-US" sz="1600" dirty="0"/>
                     </a:p>
                   </a:txBody>
                   <a:tcPr/>
@@ -18065,10 +18797,10 @@
                     <a:lstStyle/>
                     <a:p>
                       <a:r>
-                        <a:rPr lang="en-IE" dirty="0" smtClean="0"/>
+                        <a:rPr lang="en-IE" sz="1600" dirty="0" smtClean="0"/>
                         <a:t>Loan application adjudication</a:t>
                       </a:r>
-                      <a:endParaRPr lang="en-US" dirty="0"/>
+                      <a:endParaRPr lang="en-US" sz="1600" dirty="0"/>
                     </a:p>
                   </a:txBody>
                   <a:tcPr/>
@@ -18079,10 +18811,10 @@
                     <a:lstStyle/>
                     <a:p>
                       <a:r>
-                        <a:rPr lang="en-IE" dirty="0" smtClean="0"/>
+                        <a:rPr lang="en-IE" sz="1600" dirty="0" smtClean="0"/>
                         <a:t>Most banks</a:t>
                       </a:r>
-                      <a:endParaRPr lang="en-US" dirty="0"/>
+                      <a:endParaRPr lang="en-US" sz="1600" dirty="0"/>
                     </a:p>
                   </a:txBody>
                   <a:tcPr/>
@@ -18095,10 +18827,10 @@
                     <a:lstStyle/>
                     <a:p>
                       <a:r>
-                        <a:rPr lang="en-IE" dirty="0" smtClean="0"/>
+                        <a:rPr lang="en-IE" sz="1600" dirty="0" smtClean="0"/>
                         <a:t>Insurance</a:t>
                       </a:r>
-                      <a:endParaRPr lang="en-US" dirty="0"/>
+                      <a:endParaRPr lang="en-US" sz="1600" dirty="0"/>
                     </a:p>
                   </a:txBody>
                   <a:tcPr/>
@@ -18109,10 +18841,10 @@
                     <a:lstStyle/>
                     <a:p>
                       <a:r>
-                        <a:rPr lang="en-IE" dirty="0" smtClean="0"/>
+                        <a:rPr lang="en-IE" sz="1600" dirty="0" smtClean="0"/>
                         <a:t>Auto-adjudication</a:t>
                       </a:r>
-                      <a:endParaRPr lang="en-US" dirty="0"/>
+                      <a:endParaRPr lang="en-US" sz="1600" dirty="0"/>
                     </a:p>
                   </a:txBody>
                   <a:tcPr/>
@@ -18123,25 +18855,32 @@
                     <a:lstStyle/>
                     <a:p>
                       <a:r>
-                        <a:rPr lang="en-IE" dirty="0" smtClean="0"/>
-                        <a:t>UHG</a:t>
+                        <a:rPr lang="en-IE" sz="1600" dirty="0" smtClean="0"/>
+                        <a:t>UHG </a:t>
                       </a:r>
+                      <a:r>
+                        <a:rPr lang="en-IE" sz="1600" dirty="0" smtClean="0">
+                          <a:sym typeface="Wingdings" panose="05000000000000000000" pitchFamily="2" charset="2"/>
+                        </a:rPr>
+                        <a:t></a:t>
+                      </a:r>
+                      <a:endParaRPr lang="en-IE" sz="1600" dirty="0" smtClean="0"/>
                     </a:p>
                   </a:txBody>
                   <a:tcPr/>
                 </a:tc>
               </a:tr>
-              <a:tr h="698575">
+              <a:tr h="556192">
                 <a:tc>
                   <a:txBody>
                     <a:bodyPr/>
                     <a:lstStyle/>
                     <a:p>
                       <a:r>
-                        <a:rPr lang="en-IE" dirty="0" smtClean="0"/>
+                        <a:rPr lang="en-IE" sz="1600" dirty="0" smtClean="0"/>
                         <a:t>Media companies / data centres</a:t>
                       </a:r>
-                      <a:endParaRPr lang="en-US" dirty="0"/>
+                      <a:endParaRPr lang="en-US" sz="1600" dirty="0"/>
                     </a:p>
                   </a:txBody>
                   <a:tcPr/>
@@ -18152,10 +18891,10 @@
                     <a:lstStyle/>
                     <a:p>
                       <a:r>
-                        <a:rPr lang="en-IE" dirty="0" smtClean="0"/>
+                        <a:rPr lang="en-IE" sz="1600" dirty="0" smtClean="0"/>
                         <a:t>Machine translation</a:t>
                       </a:r>
-                      <a:endParaRPr lang="en-US" dirty="0"/>
+                      <a:endParaRPr lang="en-US" sz="1600" dirty="0"/>
                     </a:p>
                   </a:txBody>
                   <a:tcPr/>
@@ -18166,7 +18905,7 @@
                     <a:lstStyle/>
                     <a:p>
                       <a:r>
-                        <a:rPr lang="en-IE" dirty="0" smtClean="0"/>
+                        <a:rPr lang="en-IE" sz="1600" dirty="0" smtClean="0"/>
                         <a:t>Facebook, Google</a:t>
                       </a:r>
                     </a:p>
@@ -18174,17 +18913,17 @@
                   <a:tcPr/>
                 </a:tc>
               </a:tr>
-              <a:tr h="698575">
+              <a:tr h="414882">
                 <a:tc>
                   <a:txBody>
                     <a:bodyPr/>
                     <a:lstStyle/>
                     <a:p>
                       <a:r>
-                        <a:rPr lang="en-IE" dirty="0" smtClean="0"/>
-                        <a:t>ANY company</a:t>
+                        <a:rPr lang="en-IE" sz="1600" dirty="0" smtClean="0"/>
+                        <a:t>Sport teams</a:t>
                       </a:r>
-                      <a:endParaRPr lang="en-US" dirty="0"/>
+                      <a:endParaRPr lang="en-US" sz="1600" dirty="0"/>
                     </a:p>
                   </a:txBody>
                   <a:tcPr/>
@@ -18195,10 +18934,10 @@
                     <a:lstStyle/>
                     <a:p>
                       <a:r>
-                        <a:rPr lang="en-IE" dirty="0" smtClean="0"/>
-                        <a:t>Data driven decision-making</a:t>
+                        <a:rPr lang="en-IE" sz="1600" dirty="0" smtClean="0"/>
+                        <a:t>Reduce risk of injuries</a:t>
                       </a:r>
-                      <a:endParaRPr lang="en-US" dirty="0"/>
+                      <a:endParaRPr lang="en-US" sz="1600" dirty="0"/>
                     </a:p>
                   </a:txBody>
                   <a:tcPr/>
@@ -18209,14 +18948,58 @@
                     <a:lstStyle/>
                     <a:p>
                       <a:r>
-                        <a:rPr lang="en-IE" dirty="0" smtClean="0"/>
+                        <a:rPr lang="en-IE" sz="1600" dirty="0" smtClean="0"/>
+                        <a:t>NHL!!!</a:t>
+                      </a:r>
+                      <a:endParaRPr lang="en-IE" sz="1600" dirty="0" smtClean="0"/>
+                    </a:p>
+                  </a:txBody>
+                  <a:tcPr/>
+                </a:tc>
+              </a:tr>
+              <a:tr h="553592">
+                <a:tc>
+                  <a:txBody>
+                    <a:bodyPr/>
+                    <a:lstStyle/>
+                    <a:p>
+                      <a:r>
+                        <a:rPr lang="en-IE" sz="1600" dirty="0" smtClean="0"/>
+                        <a:t>ANY company</a:t>
+                      </a:r>
+                      <a:endParaRPr lang="en-US" sz="1600" dirty="0"/>
+                    </a:p>
+                  </a:txBody>
+                  <a:tcPr/>
+                </a:tc>
+                <a:tc>
+                  <a:txBody>
+                    <a:bodyPr/>
+                    <a:lstStyle/>
+                    <a:p>
+                      <a:r>
+                        <a:rPr lang="en-IE" sz="1600" dirty="0" smtClean="0"/>
+                        <a:t>Data driven decision-making</a:t>
+                      </a:r>
+                      <a:endParaRPr lang="en-US" sz="1600" dirty="0"/>
+                    </a:p>
+                  </a:txBody>
+                  <a:tcPr/>
+                </a:tc>
+                <a:tc>
+                  <a:txBody>
+                    <a:bodyPr/>
+                    <a:lstStyle/>
+                    <a:p>
+                      <a:r>
+                        <a:rPr lang="en-IE" sz="1600" dirty="0" smtClean="0"/>
                         <a:t>Google, Amazon, Facebook, Tesla,</a:t>
                       </a:r>
                       <a:r>
-                        <a:rPr lang="en-IE" baseline="0" dirty="0" smtClean="0"/>
+                        <a:rPr lang="en-IE" sz="1600" baseline="0" dirty="0" smtClean="0"/>
                         <a:t> Apple</a:t>
                       </a:r>
-                      <a:endParaRPr lang="en-IE" dirty="0" smtClean="0"/>
+                      <a:endParaRPr lang="en-IE" sz="1600" dirty="0" smtClean="0"/>
                     </a:p>
                   </a:txBody>
                   <a:tcPr/>
@@ -18226,6 +19009,36 @@
           </a:graphicData>
         </a:graphic>
       </p:graphicFrame>
+      <p:sp>
+        <p:nvSpPr>
+          <p:cNvPr id="9" name="TextBox 8"/>
+          <p:cNvSpPr txBox="1"/>
+          <p:nvPr/>
+        </p:nvSpPr>
+        <p:spPr>
+          <a:xfrm>
+            <a:off x="3490332" y="6312383"/>
+            <a:ext cx="2031325" cy="369332"/>
+          </a:xfrm>
+          <a:prstGeom prst="rect">
+            <a:avLst/>
+          </a:prstGeom>
+          <a:noFill/>
+        </p:spPr>
+        <p:txBody>
+          <a:bodyPr wrap="none" rtlCol="0">
+            <a:spAutoFit/>
+          </a:bodyPr>
+          <a:lstStyle/>
+          <a:p>
+            <a:r>
+              <a:rPr lang="en-IE" b="1" dirty="0" smtClean="0"/>
+              <a:t>Sky is the limit…</a:t>
+            </a:r>
+            <a:endParaRPr lang="en-US" b="1" dirty="0" err="1" smtClean="0"/>
+          </a:p>
+        </p:txBody>
+      </p:sp>
     </p:spTree>
     <p:extLst>
       <p:ext uri="{BB962C8B-B14F-4D97-AF65-F5344CB8AC3E}">
@@ -18258,7 +19071,7 @@
 </p:sld>
 </file>
 
-<file path=ppt/slides/slide15.xml><?xml version="1.0" encoding="utf-8"?>
+<file path=ppt/slides/slide14.xml><?xml version="1.0" encoding="utf-8"?>
 <p:sld xmlns:a="http://schemas.openxmlformats.org/drawingml/2006/main" xmlns:r="http://schemas.openxmlformats.org/officeDocument/2006/relationships" xmlns:p="http://schemas.openxmlformats.org/presentationml/2006/main">
   <p:cSld>
     <p:spTree>
@@ -18316,11 +19129,7 @@
           <a:p>
             <a:r>
               <a:rPr lang="en-US" dirty="0" smtClean="0"/>
-              <a:t>Data Scientists - </a:t>
-            </a:r>
-            <a:r>
-              <a:rPr lang="en-US" dirty="0" smtClean="0"/>
-              <a:t>Why</a:t>
+              <a:t>Data Scientists - Why</a:t>
             </a:r>
             <a:endParaRPr lang="en-US" dirty="0"/>
           </a:p>
@@ -18388,6 +19197,177 @@
 </p:sld>
 </file>
 
+<file path=ppt/slides/slide15.xml><?xml version="1.0" encoding="utf-8"?>
+<p:sld xmlns:a="http://schemas.openxmlformats.org/drawingml/2006/main" xmlns:r="http://schemas.openxmlformats.org/officeDocument/2006/relationships" xmlns:p="http://schemas.openxmlformats.org/presentationml/2006/main">
+  <p:cSld>
+    <p:spTree>
+      <p:nvGrpSpPr>
+        <p:cNvPr id="1" name=""/>
+        <p:cNvGrpSpPr/>
+        <p:nvPr/>
+      </p:nvGrpSpPr>
+      <p:grpSpPr>
+        <a:xfrm>
+          <a:off x="0" y="0"/>
+          <a:ext cx="0" cy="0"/>
+          <a:chOff x="0" y="0"/>
+          <a:chExt cx="0" cy="0"/>
+        </a:xfrm>
+      </p:grpSpPr>
+      <p:sp>
+        <p:nvSpPr>
+          <p:cNvPr id="2" name="Text Placeholder 1"/>
+          <p:cNvSpPr>
+            <a:spLocks noGrp="1"/>
+          </p:cNvSpPr>
+          <p:nvPr>
+            <p:ph type="body" sz="quarter" idx="13"/>
+          </p:nvPr>
+        </p:nvSpPr>
+        <p:spPr/>
+        <p:txBody>
+          <a:bodyPr/>
+          <a:lstStyle/>
+          <a:p>
+            <a:endParaRPr lang="en-US" dirty="0"/>
+          </a:p>
+        </p:txBody>
+      </p:sp>
+      <p:sp>
+        <p:nvSpPr>
+          <p:cNvPr id="17" name="Title 16"/>
+          <p:cNvSpPr>
+            <a:spLocks noGrp="1"/>
+          </p:cNvSpPr>
+          <p:nvPr>
+            <p:ph type="title"/>
+          </p:nvPr>
+        </p:nvSpPr>
+        <p:spPr>
+          <a:xfrm>
+            <a:off x="461387" y="297181"/>
+            <a:ext cx="8396863" cy="620358"/>
+          </a:xfrm>
+        </p:spPr>
+        <p:txBody>
+          <a:bodyPr/>
+          <a:lstStyle/>
+          <a:p>
+            <a:r>
+              <a:rPr lang="en-US" dirty="0" smtClean="0"/>
+              <a:t>Data Scientists - Why</a:t>
+            </a:r>
+            <a:endParaRPr lang="en-US" dirty="0"/>
+          </a:p>
+        </p:txBody>
+      </p:sp>
+      <p:grpSp>
+        <p:nvGrpSpPr>
+          <p:cNvPr id="3" name="Group 2"/>
+          <p:cNvGrpSpPr/>
+          <p:nvPr/>
+        </p:nvGrpSpPr>
+        <p:grpSpPr>
+          <a:xfrm>
+            <a:off x="1404220" y="1659228"/>
+            <a:ext cx="6417141" cy="4456285"/>
+            <a:chOff x="1423470" y="1524478"/>
+            <a:chExt cx="6417141" cy="4456285"/>
+          </a:xfrm>
+        </p:grpSpPr>
+        <p:pic>
+          <p:nvPicPr>
+            <p:cNvPr id="5" name="Picture 4"/>
+            <p:cNvPicPr>
+              <a:picLocks noChangeAspect="1"/>
+            </p:cNvPicPr>
+            <p:nvPr/>
+          </p:nvPicPr>
+          <p:blipFill rotWithShape="1">
+            <a:blip r:embed="rId3">
+              <a:extLst>
+                <a:ext uri="{28A0092B-C50C-407E-A947-70E740481C1C}">
+                  <a14:useLocalDpi xmlns:a14="http://schemas.microsoft.com/office/drawing/2010/main" val="0"/>
+                </a:ext>
+              </a:extLst>
+            </a:blip>
+            <a:srcRect b="4134"/>
+            <a:stretch/>
+          </p:blipFill>
+          <p:spPr>
+            <a:xfrm>
+              <a:off x="1765430" y="1524478"/>
+              <a:ext cx="5733223" cy="3917317"/>
+            </a:xfrm>
+            <a:prstGeom prst="rect">
+              <a:avLst/>
+            </a:prstGeom>
+          </p:spPr>
+        </p:pic>
+        <p:sp>
+          <p:nvSpPr>
+            <p:cNvPr id="6" name="TextBox 5"/>
+            <p:cNvSpPr txBox="1"/>
+            <p:nvPr/>
+          </p:nvSpPr>
+          <p:spPr>
+            <a:xfrm>
+              <a:off x="1423470" y="5611431"/>
+              <a:ext cx="6417141" cy="369332"/>
+            </a:xfrm>
+            <a:prstGeom prst="rect">
+              <a:avLst/>
+            </a:prstGeom>
+            <a:noFill/>
+          </p:spPr>
+          <p:txBody>
+            <a:bodyPr wrap="none" rtlCol="0">
+              <a:spAutoFit/>
+            </a:bodyPr>
+            <a:lstStyle/>
+            <a:p>
+              <a:pPr algn="ctr"/>
+              <a:r>
+                <a:rPr lang="en-IE" dirty="0" smtClean="0"/>
+                <a:t>If you don’t have solid basics, causing damage is really easy!</a:t>
+              </a:r>
+              <a:endParaRPr lang="en-US" dirty="0" err="1" smtClean="0"/>
+            </a:p>
+          </p:txBody>
+        </p:sp>
+      </p:grpSp>
+    </p:spTree>
+    <p:extLst>
+      <p:ext uri="{BB962C8B-B14F-4D97-AF65-F5344CB8AC3E}">
+        <p14:creationId xmlns:p14="http://schemas.microsoft.com/office/powerpoint/2010/main" val="856738667"/>
+      </p:ext>
+    </p:extLst>
+  </p:cSld>
+  <p:clrMapOvr>
+    <a:masterClrMapping/>
+  </p:clrMapOvr>
+  <mc:AlternateContent xmlns:mc="http://schemas.openxmlformats.org/markup-compatibility/2006" xmlns:p14="http://schemas.microsoft.com/office/powerpoint/2010/main">
+    <mc:Choice Requires="p14">
+      <p:transition spd="med" p14:dur="700">
+        <p:fade/>
+      </p:transition>
+    </mc:Choice>
+    <mc:Fallback xmlns="">
+      <p:transition spd="med">
+        <p:fade/>
+      </p:transition>
+    </mc:Fallback>
+  </mc:AlternateContent>
+  <p:timing>
+    <p:tnLst>
+      <p:par>
+        <p:cTn id="1" dur="indefinite" restart="never" nodeType="tmRoot"/>
+      </p:par>
+    </p:tnLst>
+  </p:timing>
+</p:sld>
+</file>
+
 <file path=ppt/slides/slide16.xml><?xml version="1.0" encoding="utf-8"?>
 <p:sld xmlns:a="http://schemas.openxmlformats.org/drawingml/2006/main" xmlns:r="http://schemas.openxmlformats.org/officeDocument/2006/relationships" xmlns:p="http://schemas.openxmlformats.org/presentationml/2006/main">
   <p:cSld>
@@ -18420,6 +19400,16 @@
           <a:bodyPr/>
           <a:lstStyle/>
           <a:p>
+            <a:r>
+              <a:rPr lang="en-IE" dirty="0" smtClean="0"/>
+              <a:t>The ones I can tell you, anyway </a:t>
+            </a:r>
+            <a:r>
+              <a:rPr lang="en-IE" dirty="0" smtClean="0">
+                <a:sym typeface="Wingdings" panose="05000000000000000000" pitchFamily="2" charset="2"/>
+              </a:rPr>
+              <a:t></a:t>
+            </a:r>
             <a:endParaRPr lang="en-US" dirty="0"/>
           </a:p>
         </p:txBody>
@@ -18434,23 +19424,18 @@
             <p:ph type="title"/>
           </p:nvPr>
         </p:nvSpPr>
-        <p:spPr>
-          <a:xfrm>
-            <a:off x="461387" y="297181"/>
-            <a:ext cx="8396863" cy="620358"/>
-          </a:xfrm>
-        </p:spPr>
+        <p:spPr/>
         <p:txBody>
           <a:bodyPr/>
           <a:lstStyle/>
           <a:p>
             <a:r>
               <a:rPr lang="en-US" dirty="0" smtClean="0"/>
-              <a:t>Data Scientists - </a:t>
+              <a:t>Some real world examples I worked </a:t>
             </a:r>
             <a:r>
               <a:rPr lang="en-US" dirty="0" smtClean="0"/>
-              <a:t>Why</a:t>
+              <a:t>on - Energy</a:t>
             </a:r>
             <a:endParaRPr lang="en-US" dirty="0"/>
           </a:p>
@@ -18458,14 +19443,14 @@
       </p:sp>
       <p:sp>
         <p:nvSpPr>
-          <p:cNvPr id="4" name="TextBox 3"/>
+          <p:cNvPr id="3" name="TextBox 2"/>
           <p:cNvSpPr txBox="1"/>
           <p:nvPr/>
         </p:nvSpPr>
         <p:spPr>
           <a:xfrm>
-            <a:off x="496956" y="2647411"/>
-            <a:ext cx="4878259" cy="1477328"/>
+            <a:off x="-4546164" y="3264649"/>
+            <a:ext cx="8485098" cy="2585323"/>
           </a:xfrm>
           <a:prstGeom prst="rect">
             <a:avLst/>
@@ -18473,117 +19458,200 @@
           <a:noFill/>
         </p:spPr>
         <p:txBody>
-          <a:bodyPr wrap="none" rtlCol="0">
+          <a:bodyPr wrap="square" rtlCol="0">
             <a:spAutoFit/>
           </a:bodyPr>
           <a:lstStyle/>
           <a:p>
             <a:r>
               <a:rPr lang="en-IE" dirty="0" smtClean="0"/>
-              <a:t>False positive paradox</a:t>
+              <a:t>Energy load forecasting</a:t>
             </a:r>
           </a:p>
           <a:p>
             <a:r>
               <a:rPr lang="en-IE" dirty="0" smtClean="0"/>
-              <a:t>Simpson’s paradox</a:t>
+              <a:t>Workload interaction assessment in data centres</a:t>
             </a:r>
           </a:p>
           <a:p>
             <a:r>
               <a:rPr lang="en-IE" dirty="0" smtClean="0"/>
-              <a:t>Meaningful metrics (accuracy and error types)</a:t>
+              <a:t>Anomaly detection in server behaviour</a:t>
             </a:r>
           </a:p>
           <a:p>
             <a:r>
               <a:rPr lang="en-IE" dirty="0" smtClean="0"/>
-              <a:t>Accuracy vs. predictive power</a:t>
-            </a:r>
-            <a:endParaRPr lang="en-IE" dirty="0" smtClean="0"/>
+              <a:t>Intelligent agents in data centres (preventive maintenance, near-real-time corrective actions)</a:t>
+            </a:r>
           </a:p>
           <a:p>
             <a:r>
               <a:rPr lang="en-IE" dirty="0" smtClean="0"/>
-              <a:t>Correlation vs. </a:t>
+              <a:t>Call centre optimization (optimizer engine and feature extraction, repeat callers, </a:t>
+            </a:r>
+            <a:r>
+              <a:rPr lang="en-IE" dirty="0" err="1" smtClean="0"/>
+              <a:t>auth</a:t>
             </a:r>
             <a:r>
               <a:rPr lang="en-IE" dirty="0" smtClean="0"/>
-              <a:t>Causality</a:t>
-            </a:r>
+              <a:t> rate, IVR optimization, </a:t>
+            </a:r>
+            <a:r>
+              <a:rPr lang="en-IE" dirty="0"/>
+              <a:t>Population segmentation</a:t>
+            </a:r>
+            <a:r>
+              <a:rPr lang="en-IE" dirty="0" smtClean="0"/>
+              <a:t>)</a:t>
+            </a:r>
+          </a:p>
+          <a:p>
+            <a:r>
+              <a:rPr lang="en-IE" dirty="0" smtClean="0"/>
+              <a:t>Early diagnosis suggestions</a:t>
+            </a:r>
+          </a:p>
+          <a:p>
             <a:endParaRPr lang="en-US" dirty="0" err="1" smtClean="0"/>
           </a:p>
         </p:txBody>
       </p:sp>
-      <p:pic>
-        <p:nvPicPr>
-          <p:cNvPr id="5" name="Picture 4"/>
-          <p:cNvPicPr>
-            <a:picLocks noChangeAspect="1"/>
-          </p:cNvPicPr>
+      <p:grpSp>
+        <p:nvGrpSpPr>
+          <p:cNvPr id="8" name="Group 7"/>
+          <p:cNvGrpSpPr/>
           <p:nvPr/>
-        </p:nvPicPr>
-        <p:blipFill>
-          <a:blip r:embed="rId3">
-            <a:extLst>
-              <a:ext uri="{28A0092B-C50C-407E-A947-70E740481C1C}">
-                <a14:useLocalDpi xmlns:a14="http://schemas.microsoft.com/office/drawing/2010/main" val="0"/>
-              </a:ext>
-            </a:extLst>
-          </a:blip>
-          <a:stretch>
-            <a:fillRect/>
-          </a:stretch>
-        </p:blipFill>
-        <p:spPr>
+        </p:nvGrpSpPr>
+        <p:grpSpPr>
           <a:xfrm>
-            <a:off x="1765430" y="1524478"/>
-            <a:ext cx="5733223" cy="4086225"/>
+            <a:off x="657542" y="1541114"/>
+            <a:ext cx="7957668" cy="5162111"/>
+            <a:chOff x="713297" y="1541114"/>
+            <a:chExt cx="7957668" cy="5162111"/>
           </a:xfrm>
-          <a:prstGeom prst="rect">
-            <a:avLst/>
-          </a:prstGeom>
-        </p:spPr>
-      </p:pic>
-      <p:sp>
-        <p:nvSpPr>
-          <p:cNvPr id="6" name="TextBox 5"/>
-          <p:cNvSpPr txBox="1"/>
-          <p:nvPr/>
-        </p:nvSpPr>
-        <p:spPr>
-          <a:xfrm>
-            <a:off x="1423470" y="5611431"/>
-            <a:ext cx="6417141" cy="369332"/>
-          </a:xfrm>
-          <a:prstGeom prst="rect">
-            <a:avLst/>
-          </a:prstGeom>
-          <a:noFill/>
-        </p:spPr>
-        <p:txBody>
-          <a:bodyPr wrap="none" rtlCol="0">
-            <a:spAutoFit/>
-          </a:bodyPr>
-          <a:lstStyle/>
-          <a:p>
-            <a:pPr algn="ctr"/>
-            <a:r>
-              <a:rPr lang="en-IE" dirty="0" smtClean="0"/>
-              <a:t>If you don’t have solid basics, </a:t>
-            </a:r>
-            <a:r>
-              <a:rPr lang="en-IE" dirty="0" smtClean="0"/>
-              <a:t>causing damage is really easy!</a:t>
-            </a:r>
-            <a:endParaRPr lang="en-US" dirty="0" err="1" smtClean="0"/>
-          </a:p>
-        </p:txBody>
-      </p:sp>
+        </p:grpSpPr>
+        <p:grpSp>
+          <p:nvGrpSpPr>
+            <p:cNvPr id="6" name="Group 5"/>
+            <p:cNvGrpSpPr/>
+            <p:nvPr/>
+          </p:nvGrpSpPr>
+          <p:grpSpPr>
+            <a:xfrm>
+              <a:off x="713297" y="1962615"/>
+              <a:ext cx="7957668" cy="4740610"/>
+              <a:chOff x="449582" y="1506765"/>
+              <a:chExt cx="8485098" cy="5196460"/>
+            </a:xfrm>
+          </p:grpSpPr>
+          <p:pic>
+            <p:nvPicPr>
+              <p:cNvPr id="4" name="Picture 3"/>
+              <p:cNvPicPr>
+                <a:picLocks noChangeAspect="1"/>
+              </p:cNvPicPr>
+              <p:nvPr/>
+            </p:nvPicPr>
+            <p:blipFill rotWithShape="1">
+              <a:blip r:embed="rId3">
+                <a:extLst>
+                  <a:ext uri="{28A0092B-C50C-407E-A947-70E740481C1C}">
+                    <a14:useLocalDpi xmlns:a14="http://schemas.microsoft.com/office/drawing/2010/main" val="0"/>
+                  </a:ext>
+                </a:extLst>
+              </a:blip>
+              <a:srcRect l="9501" t="22764" b="3739"/>
+              <a:stretch/>
+            </p:blipFill>
+            <p:spPr>
+              <a:xfrm>
+                <a:off x="449582" y="1506765"/>
+                <a:ext cx="8485098" cy="4827128"/>
+              </a:xfrm>
+              <a:prstGeom prst="rect">
+                <a:avLst/>
+              </a:prstGeom>
+            </p:spPr>
+          </p:pic>
+          <p:sp>
+            <p:nvSpPr>
+              <p:cNvPr id="5" name="TextBox 4"/>
+              <p:cNvSpPr txBox="1"/>
+              <p:nvPr/>
+            </p:nvSpPr>
+            <p:spPr>
+              <a:xfrm>
+                <a:off x="977011" y="6333893"/>
+                <a:ext cx="7430239" cy="369332"/>
+              </a:xfrm>
+              <a:prstGeom prst="rect">
+                <a:avLst/>
+              </a:prstGeom>
+              <a:noFill/>
+            </p:spPr>
+            <p:txBody>
+              <a:bodyPr wrap="none" rtlCol="0">
+                <a:spAutoFit/>
+              </a:bodyPr>
+              <a:lstStyle/>
+              <a:p>
+                <a:pPr algn="ctr"/>
+                <a:r>
+                  <a:rPr lang="en-IE" dirty="0" smtClean="0">
+                    <a:solidFill>
+                      <a:schemeClr val="accent4"/>
+                    </a:solidFill>
+                  </a:rPr>
+                  <a:t>Forecasted and observed values (sorry I had to hide the axes labels…)</a:t>
+                </a:r>
+                <a:endParaRPr lang="en-US" dirty="0" err="1" smtClean="0">
+                  <a:solidFill>
+                    <a:schemeClr val="accent4"/>
+                  </a:solidFill>
+                </a:endParaRPr>
+              </a:p>
+            </p:txBody>
+          </p:sp>
+        </p:grpSp>
+        <p:sp>
+          <p:nvSpPr>
+            <p:cNvPr id="7" name="TextBox 6"/>
+            <p:cNvSpPr txBox="1"/>
+            <p:nvPr/>
+          </p:nvSpPr>
+          <p:spPr>
+            <a:xfrm>
+              <a:off x="2118348" y="1541114"/>
+              <a:ext cx="5147563" cy="369332"/>
+            </a:xfrm>
+            <a:prstGeom prst="rect">
+              <a:avLst/>
+            </a:prstGeom>
+            <a:noFill/>
+          </p:spPr>
+          <p:txBody>
+            <a:bodyPr wrap="none" rtlCol="0">
+              <a:spAutoFit/>
+            </a:bodyPr>
+            <a:lstStyle/>
+            <a:p>
+              <a:pPr algn="ctr"/>
+              <a:r>
+                <a:rPr lang="en-IE" b="1" dirty="0" smtClean="0"/>
+                <a:t>Energy load forecasting for Energy Suppliers</a:t>
+              </a:r>
+              <a:endParaRPr lang="en-US" b="1" dirty="0" err="1" smtClean="0"/>
+            </a:p>
+          </p:txBody>
+        </p:sp>
+      </p:grpSp>
     </p:spTree>
     <p:extLst>
       <p:ext uri="{BB962C8B-B14F-4D97-AF65-F5344CB8AC3E}">
-        <p14:creationId xmlns:p14="http://schemas.microsoft.com/office/powerpoint/2010/main" val="856738667"/>
+        <p14:creationId xmlns:p14="http://schemas.microsoft.com/office/powerpoint/2010/main" val="1386234047"/>
       </p:ext>
     </p:extLst>
   </p:cSld>
@@ -18605,7 +19673,75 @@
   <p:timing>
     <p:tnLst>
       <p:par>
-        <p:cTn id="1" dur="indefinite" restart="never" nodeType="tmRoot"/>
+        <p:cTn id="1" dur="indefinite" restart="never" nodeType="tmRoot">
+          <p:childTnLst>
+            <p:seq concurrent="1" nextAc="seek">
+              <p:cTn id="2" dur="indefinite" nodeType="mainSeq">
+                <p:childTnLst>
+                  <p:par>
+                    <p:cTn id="3" fill="hold">
+                      <p:stCondLst>
+                        <p:cond delay="indefinite"/>
+                      </p:stCondLst>
+                      <p:childTnLst>
+                        <p:par>
+                          <p:cTn id="4" fill="hold">
+                            <p:stCondLst>
+                              <p:cond delay="0"/>
+                            </p:stCondLst>
+                            <p:childTnLst>
+                              <p:par>
+                                <p:cTn id="5" presetID="1" presetClass="entr" presetSubtype="0" fill="hold" nodeType="clickEffect">
+                                  <p:stCondLst>
+                                    <p:cond delay="0"/>
+                                  </p:stCondLst>
+                                  <p:childTnLst>
+                                    <p:set>
+                                      <p:cBhvr>
+                                        <p:cTn id="6" dur="1" fill="hold">
+                                          <p:stCondLst>
+                                            <p:cond delay="0"/>
+                                          </p:stCondLst>
+                                        </p:cTn>
+                                        <p:tgtEl>
+                                          <p:spTgt spid="8"/>
+                                        </p:tgtEl>
+                                        <p:attrNameLst>
+                                          <p:attrName>style.visibility</p:attrName>
+                                        </p:attrNameLst>
+                                      </p:cBhvr>
+                                      <p:to>
+                                        <p:strVal val="visible"/>
+                                      </p:to>
+                                    </p:set>
+                                  </p:childTnLst>
+                                </p:cTn>
+                              </p:par>
+                            </p:childTnLst>
+                          </p:cTn>
+                        </p:par>
+                      </p:childTnLst>
+                    </p:cTn>
+                  </p:par>
+                </p:childTnLst>
+              </p:cTn>
+              <p:prevCondLst>
+                <p:cond evt="onPrev" delay="0">
+                  <p:tgtEl>
+                    <p:sldTgt/>
+                  </p:tgtEl>
+                </p:cond>
+              </p:prevCondLst>
+              <p:nextCondLst>
+                <p:cond evt="onNext" delay="0">
+                  <p:tgtEl>
+                    <p:sldTgt/>
+                  </p:tgtEl>
+                </p:cond>
+              </p:nextCondLst>
+            </p:seq>
+          </p:childTnLst>
+        </p:cTn>
       </p:par>
     </p:tnLst>
   </p:timing>
@@ -18675,102 +19811,139 @@
           <a:p>
             <a:r>
               <a:rPr lang="en-US" dirty="0" smtClean="0"/>
-              <a:t>Some real </a:t>
+              <a:t>Some real world examples I worked </a:t>
             </a:r>
             <a:r>
               <a:rPr lang="en-US" dirty="0" smtClean="0"/>
-              <a:t>world </a:t>
-            </a:r>
-            <a:r>
-              <a:rPr lang="en-US" dirty="0" smtClean="0"/>
-              <a:t>examples I worked on</a:t>
+              <a:t>on – DC WL</a:t>
             </a:r>
             <a:endParaRPr lang="en-US" dirty="0"/>
           </a:p>
         </p:txBody>
       </p:sp>
-      <p:sp>
-        <p:nvSpPr>
-          <p:cNvPr id="3" name="TextBox 2"/>
-          <p:cNvSpPr txBox="1"/>
+      <p:grpSp>
+        <p:nvGrpSpPr>
+          <p:cNvPr id="12" name="Group 11"/>
+          <p:cNvGrpSpPr/>
           <p:nvPr/>
-        </p:nvSpPr>
-        <p:spPr>
+        </p:nvGrpSpPr>
+        <p:grpSpPr>
           <a:xfrm>
-            <a:off x="449582" y="1725780"/>
-            <a:ext cx="8485098" cy="2585323"/>
+            <a:off x="1747809" y="1587426"/>
+            <a:ext cx="5566426" cy="5225970"/>
+            <a:chOff x="7686855" y="959152"/>
+            <a:chExt cx="5989449" cy="5499178"/>
           </a:xfrm>
-          <a:prstGeom prst="rect">
-            <a:avLst/>
-          </a:prstGeom>
-          <a:noFill/>
-        </p:spPr>
-        <p:txBody>
-          <a:bodyPr wrap="square" rtlCol="0">
-            <a:spAutoFit/>
-          </a:bodyPr>
-          <a:lstStyle/>
-          <a:p>
-            <a:r>
-              <a:rPr lang="en-IE" dirty="0" smtClean="0"/>
-              <a:t>Energy load forecasting</a:t>
-            </a:r>
-          </a:p>
-          <a:p>
-            <a:r>
-              <a:rPr lang="en-IE" dirty="0" smtClean="0"/>
-              <a:t>Workload interaction assessment in data centres</a:t>
-            </a:r>
-          </a:p>
-          <a:p>
-            <a:r>
-              <a:rPr lang="en-IE" dirty="0" smtClean="0"/>
-              <a:t>Anomaly detection in server behaviour</a:t>
-            </a:r>
-          </a:p>
-          <a:p>
-            <a:r>
-              <a:rPr lang="en-IE" dirty="0" smtClean="0"/>
-              <a:t>Intelligent agents in data centres (preventive maintenance, near-real-time corrective actions)</a:t>
-            </a:r>
-          </a:p>
-          <a:p>
-            <a:r>
-              <a:rPr lang="en-IE" dirty="0" smtClean="0"/>
-              <a:t>Call centre optimization (optimizer engine and feature extraction, repeat callers, </a:t>
-            </a:r>
-            <a:r>
-              <a:rPr lang="en-IE" dirty="0" err="1" smtClean="0"/>
-              <a:t>auth</a:t>
-            </a:r>
-            <a:r>
-              <a:rPr lang="en-IE" dirty="0" smtClean="0"/>
-              <a:t> rate, IVR optimization, </a:t>
-            </a:r>
-            <a:r>
-              <a:rPr lang="en-IE" dirty="0"/>
-              <a:t>Population segmentation</a:t>
-            </a:r>
-            <a:r>
-              <a:rPr lang="en-IE" dirty="0" smtClean="0"/>
-              <a:t>)</a:t>
-            </a:r>
-          </a:p>
-          <a:p>
-            <a:r>
-              <a:rPr lang="en-IE" dirty="0" smtClean="0"/>
-              <a:t>Early diagnosis suggestions</a:t>
-            </a:r>
-          </a:p>
-          <a:p>
-            <a:endParaRPr lang="en-US" dirty="0" err="1" smtClean="0"/>
-          </a:p>
-        </p:txBody>
-      </p:sp>
+        </p:grpSpPr>
+        <p:pic>
+          <p:nvPicPr>
+            <p:cNvPr id="10" name="Picture 9"/>
+            <p:cNvPicPr>
+              <a:picLocks noChangeAspect="1"/>
+            </p:cNvPicPr>
+            <p:nvPr/>
+          </p:nvPicPr>
+          <p:blipFill>
+            <a:blip r:embed="rId3">
+              <a:extLst>
+                <a:ext uri="{28A0092B-C50C-407E-A947-70E740481C1C}">
+                  <a14:useLocalDpi xmlns:a14="http://schemas.microsoft.com/office/drawing/2010/main" val="0"/>
+                </a:ext>
+              </a:extLst>
+            </a:blip>
+            <a:stretch>
+              <a:fillRect/>
+            </a:stretch>
+          </p:blipFill>
+          <p:spPr>
+            <a:xfrm>
+              <a:off x="7686855" y="1328484"/>
+              <a:ext cx="5989449" cy="4725574"/>
+            </a:xfrm>
+            <a:prstGeom prst="rect">
+              <a:avLst/>
+            </a:prstGeom>
+          </p:spPr>
+        </p:pic>
+        <p:sp>
+          <p:nvSpPr>
+            <p:cNvPr id="11" name="TextBox 10"/>
+            <p:cNvSpPr txBox="1"/>
+            <p:nvPr/>
+          </p:nvSpPr>
+          <p:spPr>
+            <a:xfrm>
+              <a:off x="7896201" y="6088998"/>
+              <a:ext cx="5570756" cy="369332"/>
+            </a:xfrm>
+            <a:prstGeom prst="rect">
+              <a:avLst/>
+            </a:prstGeom>
+            <a:noFill/>
+          </p:spPr>
+          <p:txBody>
+            <a:bodyPr wrap="none" rtlCol="0">
+              <a:spAutoFit/>
+            </a:bodyPr>
+            <a:lstStyle/>
+            <a:p>
+              <a:pPr algn="ctr"/>
+              <a:r>
+                <a:rPr lang="en-IE" dirty="0">
+                  <a:solidFill>
+                    <a:schemeClr val="accent4"/>
+                  </a:solidFill>
+                </a:rPr>
+                <a:t>Components interaction in a Server cluster (schema)</a:t>
+              </a:r>
+              <a:endParaRPr lang="en-US" dirty="0" err="1">
+                <a:solidFill>
+                  <a:schemeClr val="accent4"/>
+                </a:solidFill>
+              </a:endParaRPr>
+            </a:p>
+          </p:txBody>
+        </p:sp>
+        <p:sp>
+          <p:nvSpPr>
+            <p:cNvPr id="13" name="TextBox 12"/>
+            <p:cNvSpPr txBox="1"/>
+            <p:nvPr/>
+          </p:nvSpPr>
+          <p:spPr>
+            <a:xfrm>
+              <a:off x="8109885" y="959152"/>
+              <a:ext cx="5143396" cy="369332"/>
+            </a:xfrm>
+            <a:prstGeom prst="rect">
+              <a:avLst/>
+            </a:prstGeom>
+            <a:noFill/>
+          </p:spPr>
+          <p:txBody>
+            <a:bodyPr wrap="none" rtlCol="0">
+              <a:spAutoFit/>
+            </a:bodyPr>
+            <a:lstStyle/>
+            <a:p>
+              <a:pPr algn="ctr"/>
+              <a:r>
+                <a:rPr lang="en-IE" b="1" dirty="0" smtClean="0"/>
+                <a:t>Workload interaction analysis in data </a:t>
+              </a:r>
+              <a:r>
+                <a:rPr lang="en-IE" b="1" dirty="0" err="1" smtClean="0"/>
+                <a:t>centers</a:t>
+              </a:r>
+              <a:endParaRPr lang="en-US" b="1" dirty="0" err="1" smtClean="0"/>
+            </a:p>
+          </p:txBody>
+        </p:sp>
+      </p:grpSp>
     </p:spTree>
     <p:extLst>
       <p:ext uri="{BB962C8B-B14F-4D97-AF65-F5344CB8AC3E}">
-        <p14:creationId xmlns:p14="http://schemas.microsoft.com/office/powerpoint/2010/main" val="1386234047"/>
+        <p14:creationId xmlns:p14="http://schemas.microsoft.com/office/powerpoint/2010/main" val="200317280"/>
       </p:ext>
     </p:extLst>
   </p:cSld>
@@ -18831,6 +20004,16 @@
           <a:bodyPr/>
           <a:lstStyle/>
           <a:p>
+            <a:r>
+              <a:rPr lang="en-IE" dirty="0" smtClean="0"/>
+              <a:t>The ones I can tell you, anyway </a:t>
+            </a:r>
+            <a:r>
+              <a:rPr lang="en-IE" dirty="0" smtClean="0">
+                <a:sym typeface="Wingdings" panose="05000000000000000000" pitchFamily="2" charset="2"/>
+              </a:rPr>
+              <a:t></a:t>
+            </a:r>
             <a:endParaRPr lang="en-US" dirty="0"/>
           </a:p>
         </p:txBody>
@@ -18845,23 +20028,167 @@
             <p:ph type="title"/>
           </p:nvPr>
         </p:nvSpPr>
-        <p:spPr/>
+        <p:spPr>
+          <a:xfrm>
+            <a:off x="282643" y="304801"/>
+            <a:ext cx="8727541" cy="620358"/>
+          </a:xfrm>
+        </p:spPr>
         <p:txBody>
           <a:bodyPr/>
           <a:lstStyle/>
           <a:p>
             <a:r>
               <a:rPr lang="en-US" dirty="0" smtClean="0"/>
-              <a:t>Conclusions</a:t>
+              <a:t>Some real world examples I worked </a:t>
+            </a:r>
+            <a:r>
+              <a:rPr lang="en-US" dirty="0" smtClean="0"/>
+              <a:t>on - Anomalies</a:t>
             </a:r>
             <a:endParaRPr lang="en-US" dirty="0"/>
+          </a:p>
+        </p:txBody>
+      </p:sp>
+      <p:pic>
+        <p:nvPicPr>
+          <p:cNvPr id="3074" name="Picture 2"/>
+          <p:cNvPicPr>
+            <a:picLocks noChangeAspect="1" noChangeArrowheads="1"/>
+          </p:cNvPicPr>
+          <p:nvPr/>
+        </p:nvPicPr>
+        <p:blipFill>
+          <a:blip r:embed="rId3">
+            <a:extLst>
+              <a:ext uri="{28A0092B-C50C-407E-A947-70E740481C1C}">
+                <a14:useLocalDpi xmlns:a14="http://schemas.microsoft.com/office/drawing/2010/main" val="0"/>
+              </a:ext>
+            </a:extLst>
+          </a:blip>
+          <a:srcRect/>
+          <a:stretch>
+            <a:fillRect/>
+          </a:stretch>
+        </p:blipFill>
+        <p:spPr bwMode="auto">
+          <a:xfrm>
+            <a:off x="238039" y="2284063"/>
+            <a:ext cx="8530883" cy="3135418"/>
+          </a:xfrm>
+          <a:prstGeom prst="rect">
+            <a:avLst/>
+          </a:prstGeom>
+          <a:noFill/>
+          <a:ln>
+            <a:noFill/>
+          </a:ln>
+          <a:extLst>
+            <a:ext uri="{909E8E84-426E-40DD-AFC4-6F175D3DCCD1}">
+              <a14:hiddenFill xmlns:a14="http://schemas.microsoft.com/office/drawing/2010/main">
+                <a:solidFill>
+                  <a:schemeClr val="accent1"/>
+                </a:solidFill>
+              </a14:hiddenFill>
+            </a:ext>
+            <a:ext uri="{91240B29-F687-4F45-9708-019B960494DF}">
+              <a14:hiddenLine xmlns:a14="http://schemas.microsoft.com/office/drawing/2010/main" w="9525">
+                <a:solidFill>
+                  <a:schemeClr val="tx1"/>
+                </a:solidFill>
+                <a:miter lim="800000"/>
+                <a:headEnd/>
+                <a:tailEnd/>
+              </a14:hiddenLine>
+            </a:ext>
+          </a:extLst>
+        </p:spPr>
+      </p:pic>
+      <p:sp>
+        <p:nvSpPr>
+          <p:cNvPr id="3" name="TextBox 2"/>
+          <p:cNvSpPr txBox="1"/>
+          <p:nvPr/>
+        </p:nvSpPr>
+        <p:spPr>
+          <a:xfrm>
+            <a:off x="2282357" y="1895397"/>
+            <a:ext cx="4442243" cy="369332"/>
+          </a:xfrm>
+          <a:prstGeom prst="rect">
+            <a:avLst/>
+          </a:prstGeom>
+          <a:noFill/>
+        </p:spPr>
+        <p:txBody>
+          <a:bodyPr wrap="none" rtlCol="0">
+            <a:spAutoFit/>
+          </a:bodyPr>
+          <a:lstStyle/>
+          <a:p>
+            <a:pPr algn="ctr"/>
+            <a:r>
+              <a:rPr lang="en-IE" b="1" dirty="0"/>
+              <a:t>Anomaly detection in server behaviour</a:t>
+            </a:r>
+            <a:endParaRPr lang="en-US" b="1" dirty="0" err="1"/>
+          </a:p>
+        </p:txBody>
+      </p:sp>
+      <p:sp>
+        <p:nvSpPr>
+          <p:cNvPr id="14" name="TextBox 13"/>
+          <p:cNvSpPr txBox="1"/>
+          <p:nvPr/>
+        </p:nvSpPr>
+        <p:spPr>
+          <a:xfrm>
+            <a:off x="1500108" y="5516698"/>
+            <a:ext cx="6006773" cy="646331"/>
+          </a:xfrm>
+          <a:prstGeom prst="rect">
+            <a:avLst/>
+          </a:prstGeom>
+          <a:noFill/>
+        </p:spPr>
+        <p:txBody>
+          <a:bodyPr wrap="none" rtlCol="0">
+            <a:spAutoFit/>
+          </a:bodyPr>
+          <a:lstStyle/>
+          <a:p>
+            <a:pPr algn="ctr"/>
+            <a:r>
+              <a:rPr lang="en-IE" dirty="0" smtClean="0">
+                <a:solidFill>
+                  <a:schemeClr val="accent4"/>
+                </a:solidFill>
+              </a:rPr>
+              <a:t>Problem: What is an anomaly?</a:t>
+            </a:r>
+          </a:p>
+          <a:p>
+            <a:pPr algn="ctr"/>
+            <a:r>
+              <a:rPr lang="en-IE" dirty="0" smtClean="0">
+                <a:solidFill>
+                  <a:schemeClr val="accent4"/>
+                </a:solidFill>
+              </a:rPr>
+              <a:t>How do you define it in a simple and unambiguous way?</a:t>
+            </a:r>
+            <a:endParaRPr lang="en-US" dirty="0" err="1">
+              <a:solidFill>
+                <a:schemeClr val="accent4"/>
+              </a:solidFill>
+            </a:endParaRPr>
           </a:p>
         </p:txBody>
       </p:sp>
     </p:spTree>
     <p:extLst>
       <p:ext uri="{BB962C8B-B14F-4D97-AF65-F5344CB8AC3E}">
-        <p14:creationId xmlns:p14="http://schemas.microsoft.com/office/powerpoint/2010/main" val="1386234047"/>
+        <p14:creationId xmlns:p14="http://schemas.microsoft.com/office/powerpoint/2010/main" val="3722955123"/>
       </p:ext>
     </p:extLst>
   </p:cSld>
@@ -18922,6 +20249,16 @@
           <a:bodyPr/>
           <a:lstStyle/>
           <a:p>
+            <a:r>
+              <a:rPr lang="en-IE" dirty="0" smtClean="0"/>
+              <a:t>The ones I can tell you, anyway </a:t>
+            </a:r>
+            <a:r>
+              <a:rPr lang="en-IE" dirty="0" smtClean="0">
+                <a:sym typeface="Wingdings" panose="05000000000000000000" pitchFamily="2" charset="2"/>
+              </a:rPr>
+              <a:t></a:t>
+            </a:r>
             <a:endParaRPr lang="en-US" dirty="0"/>
           </a:p>
         </p:txBody>
@@ -18942,16 +20279,94 @@
           <a:lstStyle/>
           <a:p>
             <a:r>
-              <a:rPr lang="en-IE" dirty="0" smtClean="0"/>
-              <a:t>Q/A</a:t>
+              <a:rPr lang="en-US" dirty="0" smtClean="0"/>
+              <a:t>Some real world examples I worked </a:t>
+            </a:r>
+            <a:r>
+              <a:rPr lang="en-US" dirty="0" smtClean="0"/>
+              <a:t>on - IA</a:t>
             </a:r>
             <a:endParaRPr lang="en-US" dirty="0"/>
+          </a:p>
+        </p:txBody>
+      </p:sp>
+      <p:sp>
+        <p:nvSpPr>
+          <p:cNvPr id="3" name="TextBox 2"/>
+          <p:cNvSpPr txBox="1"/>
+          <p:nvPr/>
+        </p:nvSpPr>
+        <p:spPr>
+          <a:xfrm>
+            <a:off x="2645707" y="1450714"/>
+            <a:ext cx="3839514" cy="369332"/>
+          </a:xfrm>
+          <a:prstGeom prst="rect">
+            <a:avLst/>
+          </a:prstGeom>
+          <a:noFill/>
+        </p:spPr>
+        <p:txBody>
+          <a:bodyPr wrap="none" rtlCol="0">
+            <a:spAutoFit/>
+          </a:bodyPr>
+          <a:lstStyle/>
+          <a:p>
+            <a:pPr algn="ctr"/>
+            <a:r>
+              <a:rPr lang="en-IE" b="1" dirty="0" smtClean="0"/>
+              <a:t>Intelligent agents in Data </a:t>
+            </a:r>
+            <a:r>
+              <a:rPr lang="en-IE" b="1" dirty="0" err="1" smtClean="0"/>
+              <a:t>Centers</a:t>
+            </a:r>
+            <a:endParaRPr lang="en-US" b="1" dirty="0" err="1"/>
+          </a:p>
+        </p:txBody>
+      </p:sp>
+      <p:sp>
+        <p:nvSpPr>
+          <p:cNvPr id="14" name="TextBox 13"/>
+          <p:cNvSpPr txBox="1"/>
+          <p:nvPr/>
+        </p:nvSpPr>
+        <p:spPr>
+          <a:xfrm>
+            <a:off x="1523610" y="6141341"/>
+            <a:ext cx="6083717" cy="369332"/>
+          </a:xfrm>
+          <a:prstGeom prst="rect">
+            <a:avLst/>
+          </a:prstGeom>
+          <a:noFill/>
+        </p:spPr>
+        <p:txBody>
+          <a:bodyPr wrap="none" rtlCol="0">
+            <a:spAutoFit/>
+          </a:bodyPr>
+          <a:lstStyle/>
+          <a:p>
+            <a:pPr algn="ctr"/>
+            <a:r>
+              <a:rPr lang="en-IE" dirty="0" smtClean="0">
+                <a:solidFill>
+                  <a:schemeClr val="accent4"/>
+                </a:solidFill>
+              </a:rPr>
+              <a:t>Automate complex tasks using intelligent cognitive agents</a:t>
+            </a:r>
+            <a:endParaRPr lang="en-US" dirty="0" err="1">
+              <a:solidFill>
+                <a:schemeClr val="accent4"/>
+              </a:solidFill>
+            </a:endParaRPr>
           </a:p>
         </p:txBody>
       </p:sp>
       <p:pic>
         <p:nvPicPr>
-          <p:cNvPr id="3" name="Picture 2"/>
+          <p:cNvPr id="4" name="Picture 3"/>
           <p:cNvPicPr>
             <a:picLocks noChangeAspect="1"/>
           </p:cNvPicPr>
@@ -18971,8 +20386,8 @@
         </p:blipFill>
         <p:spPr>
           <a:xfrm>
-            <a:off x="572876" y="1738828"/>
-            <a:ext cx="8009263" cy="4528744"/>
+            <a:off x="1657773" y="1949782"/>
+            <a:ext cx="5815373" cy="4213643"/>
           </a:xfrm>
           <a:prstGeom prst="rect">
             <a:avLst/>
@@ -18982,7 +20397,7 @@
     </p:spTree>
     <p:extLst>
       <p:ext uri="{BB962C8B-B14F-4D97-AF65-F5344CB8AC3E}">
-        <p14:creationId xmlns:p14="http://schemas.microsoft.com/office/powerpoint/2010/main" val="1002772693"/>
+        <p14:creationId xmlns:p14="http://schemas.microsoft.com/office/powerpoint/2010/main" val="1397368081"/>
       </p:ext>
     </p:extLst>
   </p:cSld>
@@ -19050,11 +20465,7 @@
           <a:p>
             <a:r>
               <a:rPr lang="en-US" sz="2800" dirty="0" smtClean="0"/>
-              <a:t>About </a:t>
-            </a:r>
-            <a:r>
-              <a:rPr lang="en-US" sz="2800" dirty="0" smtClean="0"/>
-              <a:t>me – Who I am</a:t>
+              <a:t>About me – Who I am</a:t>
             </a:r>
             <a:endParaRPr lang="en-US" sz="2800" dirty="0"/>
           </a:p>
@@ -19813,6 +21224,16 @@
           <a:bodyPr/>
           <a:lstStyle/>
           <a:p>
+            <a:r>
+              <a:rPr lang="en-IE" dirty="0" smtClean="0"/>
+              <a:t>The ones I can tell you, anyway </a:t>
+            </a:r>
+            <a:r>
+              <a:rPr lang="en-IE" dirty="0" smtClean="0">
+                <a:sym typeface="Wingdings" panose="05000000000000000000" pitchFamily="2" charset="2"/>
+              </a:rPr>
+              <a:t></a:t>
+            </a:r>
             <a:endParaRPr lang="en-US" dirty="0"/>
           </a:p>
         </p:txBody>
@@ -19834,7 +21255,1057 @@
           <a:p>
             <a:r>
               <a:rPr lang="en-US" dirty="0" smtClean="0"/>
-              <a:t>Thanks</a:t>
+              <a:t>Some real world examples I worked </a:t>
+            </a:r>
+            <a:r>
+              <a:rPr lang="en-US" dirty="0" smtClean="0"/>
+              <a:t>on - Calls</a:t>
+            </a:r>
+            <a:endParaRPr lang="en-US" dirty="0"/>
+          </a:p>
+        </p:txBody>
+      </p:sp>
+      <p:grpSp>
+        <p:nvGrpSpPr>
+          <p:cNvPr id="5" name="Group 4"/>
+          <p:cNvGrpSpPr/>
+          <p:nvPr/>
+        </p:nvGrpSpPr>
+        <p:grpSpPr>
+          <a:xfrm>
+            <a:off x="429248" y="1451769"/>
+            <a:ext cx="8272457" cy="5240589"/>
+            <a:chOff x="429248" y="1451769"/>
+            <a:chExt cx="8272457" cy="5240589"/>
+          </a:xfrm>
+        </p:grpSpPr>
+        <p:pic>
+          <p:nvPicPr>
+            <p:cNvPr id="1026" name="Picture 2"/>
+            <p:cNvPicPr>
+              <a:picLocks noChangeAspect="1" noChangeArrowheads="1"/>
+            </p:cNvPicPr>
+            <p:nvPr/>
+          </p:nvPicPr>
+          <p:blipFill>
+            <a:blip r:embed="rId3">
+              <a:extLst>
+                <a:ext uri="{28A0092B-C50C-407E-A947-70E740481C1C}">
+                  <a14:useLocalDpi xmlns:a14="http://schemas.microsoft.com/office/drawing/2010/main" val="0"/>
+                </a:ext>
+              </a:extLst>
+            </a:blip>
+            <a:srcRect/>
+            <a:stretch>
+              <a:fillRect/>
+            </a:stretch>
+          </p:blipFill>
+          <p:spPr bwMode="auto">
+            <a:xfrm>
+              <a:off x="1271238" y="1792534"/>
+              <a:ext cx="6700799" cy="4586352"/>
+            </a:xfrm>
+            <a:prstGeom prst="rect">
+              <a:avLst/>
+            </a:prstGeom>
+            <a:noFill/>
+            <a:ln>
+              <a:noFill/>
+            </a:ln>
+            <a:extLst>
+              <a:ext uri="{909E8E84-426E-40DD-AFC4-6F175D3DCCD1}">
+                <a14:hiddenFill xmlns:a14="http://schemas.microsoft.com/office/drawing/2010/main">
+                  <a:solidFill>
+                    <a:schemeClr val="accent1"/>
+                  </a:solidFill>
+                </a14:hiddenFill>
+              </a:ext>
+              <a:ext uri="{91240B29-F687-4F45-9708-019B960494DF}">
+                <a14:hiddenLine xmlns:a14="http://schemas.microsoft.com/office/drawing/2010/main" w="9525">
+                  <a:solidFill>
+                    <a:schemeClr val="tx1"/>
+                  </a:solidFill>
+                  <a:miter lim="800000"/>
+                  <a:headEnd/>
+                  <a:tailEnd/>
+                </a14:hiddenLine>
+              </a:ext>
+            </a:extLst>
+          </p:spPr>
+        </p:pic>
+        <p:sp>
+          <p:nvSpPr>
+            <p:cNvPr id="9" name="TextBox 8"/>
+            <p:cNvSpPr txBox="1"/>
+            <p:nvPr/>
+          </p:nvSpPr>
+          <p:spPr>
+            <a:xfrm>
+              <a:off x="3272555" y="1451769"/>
+              <a:ext cx="2698175" cy="369332"/>
+            </a:xfrm>
+            <a:prstGeom prst="rect">
+              <a:avLst/>
+            </a:prstGeom>
+            <a:noFill/>
+          </p:spPr>
+          <p:txBody>
+            <a:bodyPr wrap="none" rtlCol="0">
+              <a:spAutoFit/>
+            </a:bodyPr>
+            <a:lstStyle/>
+            <a:p>
+              <a:pPr algn="ctr"/>
+              <a:r>
+                <a:rPr lang="en-IE" b="1" dirty="0" smtClean="0"/>
+                <a:t>Diagnosis support tool	</a:t>
+              </a:r>
+              <a:endParaRPr lang="en-US" b="1" dirty="0" err="1"/>
+            </a:p>
+          </p:txBody>
+        </p:sp>
+        <p:sp>
+          <p:nvSpPr>
+            <p:cNvPr id="10" name="TextBox 9"/>
+            <p:cNvSpPr txBox="1"/>
+            <p:nvPr/>
+          </p:nvSpPr>
+          <p:spPr>
+            <a:xfrm>
+              <a:off x="429248" y="6323026"/>
+              <a:ext cx="8272457" cy="369332"/>
+            </a:xfrm>
+            <a:prstGeom prst="rect">
+              <a:avLst/>
+            </a:prstGeom>
+            <a:noFill/>
+          </p:spPr>
+          <p:txBody>
+            <a:bodyPr wrap="none" rtlCol="0">
+              <a:spAutoFit/>
+            </a:bodyPr>
+            <a:lstStyle/>
+            <a:p>
+              <a:pPr algn="ctr"/>
+              <a:r>
+                <a:rPr lang="en-IE" dirty="0" smtClean="0">
+                  <a:solidFill>
+                    <a:schemeClr val="accent4"/>
+                  </a:solidFill>
+                </a:rPr>
+                <a:t>Infer possible diagnoses from symptom description using NLP and co-morbidity</a:t>
+              </a:r>
+              <a:endParaRPr lang="en-US" dirty="0" err="1">
+                <a:solidFill>
+                  <a:schemeClr val="accent4"/>
+                </a:solidFill>
+              </a:endParaRPr>
+            </a:p>
+          </p:txBody>
+        </p:sp>
+      </p:grpSp>
+      <p:grpSp>
+        <p:nvGrpSpPr>
+          <p:cNvPr id="7" name="Group 6"/>
+          <p:cNvGrpSpPr/>
+          <p:nvPr/>
+        </p:nvGrpSpPr>
+        <p:grpSpPr>
+          <a:xfrm>
+            <a:off x="0" y="1810377"/>
+            <a:ext cx="9144000" cy="4550666"/>
+            <a:chOff x="4627" y="1658473"/>
+            <a:chExt cx="9144000" cy="4550666"/>
+          </a:xfrm>
+        </p:grpSpPr>
+        <p:pic>
+          <p:nvPicPr>
+            <p:cNvPr id="4" name="Picture 3"/>
+            <p:cNvPicPr>
+              <a:picLocks noChangeAspect="1"/>
+            </p:cNvPicPr>
+            <p:nvPr/>
+          </p:nvPicPr>
+          <p:blipFill>
+            <a:blip r:embed="rId4">
+              <a:extLst>
+                <a:ext uri="{28A0092B-C50C-407E-A947-70E740481C1C}">
+                  <a14:useLocalDpi xmlns:a14="http://schemas.microsoft.com/office/drawing/2010/main" val="0"/>
+                </a:ext>
+              </a:extLst>
+            </a:blip>
+            <a:stretch>
+              <a:fillRect/>
+            </a:stretch>
+          </p:blipFill>
+          <p:spPr>
+            <a:xfrm>
+              <a:off x="4627" y="2099881"/>
+              <a:ext cx="9144000" cy="3585410"/>
+            </a:xfrm>
+            <a:prstGeom prst="rect">
+              <a:avLst/>
+            </a:prstGeom>
+          </p:spPr>
+        </p:pic>
+        <p:sp>
+          <p:nvSpPr>
+            <p:cNvPr id="13" name="TextBox 12"/>
+            <p:cNvSpPr txBox="1"/>
+            <p:nvPr/>
+          </p:nvSpPr>
+          <p:spPr>
+            <a:xfrm>
+              <a:off x="3494191" y="1658473"/>
+              <a:ext cx="2142574" cy="369332"/>
+            </a:xfrm>
+            <a:prstGeom prst="rect">
+              <a:avLst/>
+            </a:prstGeom>
+            <a:noFill/>
+          </p:spPr>
+          <p:txBody>
+            <a:bodyPr wrap="none" rtlCol="0">
+              <a:spAutoFit/>
+            </a:bodyPr>
+            <a:lstStyle/>
+            <a:p>
+              <a:pPr algn="ctr"/>
+              <a:r>
+                <a:rPr lang="en-IE" b="1" dirty="0" smtClean="0"/>
+                <a:t>Virtual assistance</a:t>
+              </a:r>
+              <a:endParaRPr lang="en-US" b="1" dirty="0" err="1"/>
+            </a:p>
+          </p:txBody>
+        </p:sp>
+        <p:sp>
+          <p:nvSpPr>
+            <p:cNvPr id="15" name="TextBox 14"/>
+            <p:cNvSpPr txBox="1"/>
+            <p:nvPr/>
+          </p:nvSpPr>
+          <p:spPr>
+            <a:xfrm>
+              <a:off x="1829857" y="5839807"/>
+              <a:ext cx="5583581" cy="369332"/>
+            </a:xfrm>
+            <a:prstGeom prst="rect">
+              <a:avLst/>
+            </a:prstGeom>
+            <a:noFill/>
+          </p:spPr>
+          <p:txBody>
+            <a:bodyPr wrap="none" rtlCol="0">
+              <a:spAutoFit/>
+            </a:bodyPr>
+            <a:lstStyle/>
+            <a:p>
+              <a:pPr algn="ctr"/>
+              <a:r>
+                <a:rPr lang="en-IE" dirty="0" smtClean="0">
+                  <a:solidFill>
+                    <a:schemeClr val="accent4"/>
+                  </a:solidFill>
+                </a:rPr>
+                <a:t>Assist operations by keeping track of important items</a:t>
+              </a:r>
+              <a:endParaRPr lang="en-US" dirty="0" err="1">
+                <a:solidFill>
+                  <a:schemeClr val="accent4"/>
+                </a:solidFill>
+              </a:endParaRPr>
+            </a:p>
+          </p:txBody>
+        </p:sp>
+      </p:grpSp>
+      <p:grpSp>
+        <p:nvGrpSpPr>
+          <p:cNvPr id="8" name="Group 7"/>
+          <p:cNvGrpSpPr/>
+          <p:nvPr/>
+        </p:nvGrpSpPr>
+        <p:grpSpPr>
+          <a:xfrm>
+            <a:off x="-11149" y="1636435"/>
+            <a:ext cx="9144000" cy="5088189"/>
+            <a:chOff x="-3668751" y="1234837"/>
+            <a:chExt cx="9144000" cy="5088189"/>
+          </a:xfrm>
+        </p:grpSpPr>
+        <p:pic>
+          <p:nvPicPr>
+            <p:cNvPr id="1027" name="Picture 3"/>
+            <p:cNvPicPr>
+              <a:picLocks noChangeAspect="1" noChangeArrowheads="1"/>
+            </p:cNvPicPr>
+            <p:nvPr/>
+          </p:nvPicPr>
+          <p:blipFill>
+            <a:blip r:embed="rId5">
+              <a:extLst>
+                <a:ext uri="{28A0092B-C50C-407E-A947-70E740481C1C}">
+                  <a14:useLocalDpi xmlns:a14="http://schemas.microsoft.com/office/drawing/2010/main" val="0"/>
+                </a:ext>
+              </a:extLst>
+            </a:blip>
+            <a:srcRect/>
+            <a:stretch>
+              <a:fillRect/>
+            </a:stretch>
+          </p:blipFill>
+          <p:spPr bwMode="auto">
+            <a:xfrm>
+              <a:off x="-3668751" y="1636435"/>
+              <a:ext cx="9144000" cy="4260475"/>
+            </a:xfrm>
+            <a:prstGeom prst="rect">
+              <a:avLst/>
+            </a:prstGeom>
+            <a:noFill/>
+            <a:ln>
+              <a:noFill/>
+            </a:ln>
+            <a:extLst>
+              <a:ext uri="{909E8E84-426E-40DD-AFC4-6F175D3DCCD1}">
+                <a14:hiddenFill xmlns:a14="http://schemas.microsoft.com/office/drawing/2010/main">
+                  <a:solidFill>
+                    <a:schemeClr val="accent1"/>
+                  </a:solidFill>
+                </a14:hiddenFill>
+              </a:ext>
+              <a:ext uri="{91240B29-F687-4F45-9708-019B960494DF}">
+                <a14:hiddenLine xmlns:a14="http://schemas.microsoft.com/office/drawing/2010/main" w="9525">
+                  <a:solidFill>
+                    <a:schemeClr val="tx1"/>
+                  </a:solidFill>
+                  <a:miter lim="800000"/>
+                  <a:headEnd/>
+                  <a:tailEnd/>
+                </a14:hiddenLine>
+              </a:ext>
+            </a:extLst>
+          </p:spPr>
+        </p:pic>
+        <p:sp>
+          <p:nvSpPr>
+            <p:cNvPr id="18" name="TextBox 17"/>
+            <p:cNvSpPr txBox="1"/>
+            <p:nvPr/>
+          </p:nvSpPr>
+          <p:spPr>
+            <a:xfrm>
+              <a:off x="-1196037" y="5953694"/>
+              <a:ext cx="4198585" cy="369332"/>
+            </a:xfrm>
+            <a:prstGeom prst="rect">
+              <a:avLst/>
+            </a:prstGeom>
+            <a:noFill/>
+          </p:spPr>
+          <p:txBody>
+            <a:bodyPr wrap="none" rtlCol="0">
+              <a:spAutoFit/>
+            </a:bodyPr>
+            <a:lstStyle/>
+            <a:p>
+              <a:pPr algn="ctr"/>
+              <a:r>
+                <a:rPr lang="en-IE" dirty="0" smtClean="0">
+                  <a:solidFill>
+                    <a:schemeClr val="accent4"/>
+                  </a:solidFill>
+                </a:rPr>
+                <a:t>Determine ways to optimise the system</a:t>
+              </a:r>
+              <a:endParaRPr lang="en-US" dirty="0" err="1">
+                <a:solidFill>
+                  <a:schemeClr val="accent4"/>
+                </a:solidFill>
+              </a:endParaRPr>
+            </a:p>
+          </p:txBody>
+        </p:sp>
+        <p:sp>
+          <p:nvSpPr>
+            <p:cNvPr id="19" name="TextBox 18"/>
+            <p:cNvSpPr txBox="1"/>
+            <p:nvPr/>
+          </p:nvSpPr>
+          <p:spPr>
+            <a:xfrm>
+              <a:off x="-1593574" y="1234837"/>
+              <a:ext cx="4993676" cy="369332"/>
+            </a:xfrm>
+            <a:prstGeom prst="rect">
+              <a:avLst/>
+            </a:prstGeom>
+            <a:noFill/>
+          </p:spPr>
+          <p:txBody>
+            <a:bodyPr wrap="none" rtlCol="0">
+              <a:spAutoFit/>
+            </a:bodyPr>
+            <a:lstStyle/>
+            <a:p>
+              <a:pPr algn="ctr"/>
+              <a:r>
+                <a:rPr lang="en-IE" b="1" dirty="0" smtClean="0"/>
+                <a:t>Repeat calls, </a:t>
+              </a:r>
+              <a:r>
+                <a:rPr lang="en-IE" b="1" dirty="0" err="1" smtClean="0"/>
+                <a:t>auth</a:t>
+              </a:r>
+              <a:r>
+                <a:rPr lang="en-IE" b="1" dirty="0" smtClean="0"/>
+                <a:t> rate, system optimisation</a:t>
+              </a:r>
+              <a:endParaRPr lang="en-US" b="1" dirty="0" err="1"/>
+            </a:p>
+          </p:txBody>
+        </p:sp>
+      </p:grpSp>
+    </p:spTree>
+    <p:extLst>
+      <p:ext uri="{BB962C8B-B14F-4D97-AF65-F5344CB8AC3E}">
+        <p14:creationId xmlns:p14="http://schemas.microsoft.com/office/powerpoint/2010/main" val="2738638181"/>
+      </p:ext>
+    </p:extLst>
+  </p:cSld>
+  <p:clrMapOvr>
+    <a:masterClrMapping/>
+  </p:clrMapOvr>
+  <mc:AlternateContent xmlns:mc="http://schemas.openxmlformats.org/markup-compatibility/2006" xmlns:p14="http://schemas.microsoft.com/office/powerpoint/2010/main">
+    <mc:Choice Requires="p14">
+      <p:transition spd="med" p14:dur="700">
+        <p:fade/>
+      </p:transition>
+    </mc:Choice>
+    <mc:Fallback xmlns="">
+      <p:transition spd="med">
+        <p:fade/>
+      </p:transition>
+    </mc:Fallback>
+  </mc:AlternateContent>
+  <p:timing>
+    <p:tnLst>
+      <p:par>
+        <p:cTn id="1" dur="indefinite" restart="never" nodeType="tmRoot">
+          <p:childTnLst>
+            <p:seq concurrent="1" nextAc="seek">
+              <p:cTn id="2" dur="indefinite" nodeType="mainSeq">
+                <p:childTnLst>
+                  <p:par>
+                    <p:cTn id="3" fill="hold">
+                      <p:stCondLst>
+                        <p:cond delay="indefinite"/>
+                      </p:stCondLst>
+                      <p:childTnLst>
+                        <p:par>
+                          <p:cTn id="4" fill="hold">
+                            <p:stCondLst>
+                              <p:cond delay="0"/>
+                            </p:stCondLst>
+                            <p:childTnLst>
+                              <p:par>
+                                <p:cTn id="5" presetID="1" presetClass="exit" presetSubtype="0" fill="hold" nodeType="clickEffect">
+                                  <p:stCondLst>
+                                    <p:cond delay="0"/>
+                                  </p:stCondLst>
+                                  <p:childTnLst>
+                                    <p:set>
+                                      <p:cBhvr>
+                                        <p:cTn id="6" dur="1" fill="hold">
+                                          <p:stCondLst>
+                                            <p:cond delay="0"/>
+                                          </p:stCondLst>
+                                        </p:cTn>
+                                        <p:tgtEl>
+                                          <p:spTgt spid="7"/>
+                                        </p:tgtEl>
+                                        <p:attrNameLst>
+                                          <p:attrName>style.visibility</p:attrName>
+                                        </p:attrNameLst>
+                                      </p:cBhvr>
+                                      <p:to>
+                                        <p:strVal val="hidden"/>
+                                      </p:to>
+                                    </p:set>
+                                  </p:childTnLst>
+                                </p:cTn>
+                              </p:par>
+                              <p:par>
+                                <p:cTn id="7" presetID="1" presetClass="entr" presetSubtype="0" fill="hold" nodeType="withEffect">
+                                  <p:stCondLst>
+                                    <p:cond delay="0"/>
+                                  </p:stCondLst>
+                                  <p:childTnLst>
+                                    <p:set>
+                                      <p:cBhvr>
+                                        <p:cTn id="8" dur="1" fill="hold">
+                                          <p:stCondLst>
+                                            <p:cond delay="0"/>
+                                          </p:stCondLst>
+                                        </p:cTn>
+                                        <p:tgtEl>
+                                          <p:spTgt spid="5"/>
+                                        </p:tgtEl>
+                                        <p:attrNameLst>
+                                          <p:attrName>style.visibility</p:attrName>
+                                        </p:attrNameLst>
+                                      </p:cBhvr>
+                                      <p:to>
+                                        <p:strVal val="visible"/>
+                                      </p:to>
+                                    </p:set>
+                                  </p:childTnLst>
+                                </p:cTn>
+                              </p:par>
+                            </p:childTnLst>
+                          </p:cTn>
+                        </p:par>
+                      </p:childTnLst>
+                    </p:cTn>
+                  </p:par>
+                  <p:par>
+                    <p:cTn id="9" fill="hold">
+                      <p:stCondLst>
+                        <p:cond delay="indefinite"/>
+                      </p:stCondLst>
+                      <p:childTnLst>
+                        <p:par>
+                          <p:cTn id="10" fill="hold">
+                            <p:stCondLst>
+                              <p:cond delay="0"/>
+                            </p:stCondLst>
+                            <p:childTnLst>
+                              <p:par>
+                                <p:cTn id="11" presetID="1" presetClass="exit" presetSubtype="0" fill="hold" nodeType="clickEffect">
+                                  <p:stCondLst>
+                                    <p:cond delay="0"/>
+                                  </p:stCondLst>
+                                  <p:childTnLst>
+                                    <p:set>
+                                      <p:cBhvr>
+                                        <p:cTn id="12" dur="1" fill="hold">
+                                          <p:stCondLst>
+                                            <p:cond delay="0"/>
+                                          </p:stCondLst>
+                                        </p:cTn>
+                                        <p:tgtEl>
+                                          <p:spTgt spid="5"/>
+                                        </p:tgtEl>
+                                        <p:attrNameLst>
+                                          <p:attrName>style.visibility</p:attrName>
+                                        </p:attrNameLst>
+                                      </p:cBhvr>
+                                      <p:to>
+                                        <p:strVal val="hidden"/>
+                                      </p:to>
+                                    </p:set>
+                                  </p:childTnLst>
+                                </p:cTn>
+                              </p:par>
+                              <p:par>
+                                <p:cTn id="13" presetID="1" presetClass="entr" presetSubtype="0" fill="hold" nodeType="withEffect">
+                                  <p:stCondLst>
+                                    <p:cond delay="0"/>
+                                  </p:stCondLst>
+                                  <p:childTnLst>
+                                    <p:set>
+                                      <p:cBhvr>
+                                        <p:cTn id="14" dur="1" fill="hold">
+                                          <p:stCondLst>
+                                            <p:cond delay="0"/>
+                                          </p:stCondLst>
+                                        </p:cTn>
+                                        <p:tgtEl>
+                                          <p:spTgt spid="8"/>
+                                        </p:tgtEl>
+                                        <p:attrNameLst>
+                                          <p:attrName>style.visibility</p:attrName>
+                                        </p:attrNameLst>
+                                      </p:cBhvr>
+                                      <p:to>
+                                        <p:strVal val="visible"/>
+                                      </p:to>
+                                    </p:set>
+                                  </p:childTnLst>
+                                </p:cTn>
+                              </p:par>
+                            </p:childTnLst>
+                          </p:cTn>
+                        </p:par>
+                      </p:childTnLst>
+                    </p:cTn>
+                  </p:par>
+                </p:childTnLst>
+              </p:cTn>
+              <p:prevCondLst>
+                <p:cond evt="onPrev" delay="0">
+                  <p:tgtEl>
+                    <p:sldTgt/>
+                  </p:tgtEl>
+                </p:cond>
+              </p:prevCondLst>
+              <p:nextCondLst>
+                <p:cond evt="onNext" delay="0">
+                  <p:tgtEl>
+                    <p:sldTgt/>
+                  </p:tgtEl>
+                </p:cond>
+              </p:nextCondLst>
+            </p:seq>
+          </p:childTnLst>
+        </p:cTn>
+      </p:par>
+    </p:tnLst>
+  </p:timing>
+</p:sld>
+</file>
+
+<file path=ppt/slides/slide21.xml><?xml version="1.0" encoding="utf-8"?>
+<p:sld xmlns:a="http://schemas.openxmlformats.org/drawingml/2006/main" xmlns:r="http://schemas.openxmlformats.org/officeDocument/2006/relationships" xmlns:p="http://schemas.openxmlformats.org/presentationml/2006/main">
+  <p:cSld>
+    <p:spTree>
+      <p:nvGrpSpPr>
+        <p:cNvPr id="1" name=""/>
+        <p:cNvGrpSpPr/>
+        <p:nvPr/>
+      </p:nvGrpSpPr>
+      <p:grpSpPr>
+        <a:xfrm>
+          <a:off x="0" y="0"/>
+          <a:ext cx="0" cy="0"/>
+          <a:chOff x="0" y="0"/>
+          <a:chExt cx="0" cy="0"/>
+        </a:xfrm>
+      </p:grpSpPr>
+      <p:sp>
+        <p:nvSpPr>
+          <p:cNvPr id="2" name="Content Placeholder 1"/>
+          <p:cNvSpPr>
+            <a:spLocks noGrp="1"/>
+          </p:cNvSpPr>
+          <p:nvPr>
+            <p:ph idx="1"/>
+          </p:nvPr>
+        </p:nvSpPr>
+        <p:spPr/>
+        <p:txBody>
+          <a:bodyPr/>
+          <a:lstStyle/>
+          <a:p>
+            <a:endParaRPr lang="en-US"/>
+          </a:p>
+        </p:txBody>
+      </p:sp>
+      <p:sp>
+        <p:nvSpPr>
+          <p:cNvPr id="3" name="Text Placeholder 2"/>
+          <p:cNvSpPr>
+            <a:spLocks noGrp="1"/>
+          </p:cNvSpPr>
+          <p:nvPr>
+            <p:ph type="body" sz="quarter" idx="13"/>
+          </p:nvPr>
+        </p:nvSpPr>
+        <p:spPr/>
+        <p:txBody>
+          <a:bodyPr/>
+          <a:lstStyle/>
+          <a:p>
+            <a:endParaRPr lang="en-US"/>
+          </a:p>
+        </p:txBody>
+      </p:sp>
+      <p:sp>
+        <p:nvSpPr>
+          <p:cNvPr id="4" name="Title 3"/>
+          <p:cNvSpPr>
+            <a:spLocks noGrp="1"/>
+          </p:cNvSpPr>
+          <p:nvPr>
+            <p:ph type="title"/>
+          </p:nvPr>
+        </p:nvSpPr>
+        <p:spPr/>
+        <p:txBody>
+          <a:bodyPr/>
+          <a:lstStyle/>
+          <a:p>
+            <a:r>
+              <a:rPr lang="en-IE" dirty="0" smtClean="0"/>
+              <a:t>Some Data Science results in the last 20 years</a:t>
+            </a:r>
+            <a:endParaRPr lang="en-US" dirty="0"/>
+          </a:p>
+        </p:txBody>
+      </p:sp>
+    </p:spTree>
+    <p:extLst>
+      <p:ext uri="{BB962C8B-B14F-4D97-AF65-F5344CB8AC3E}">
+        <p14:creationId xmlns:p14="http://schemas.microsoft.com/office/powerpoint/2010/main" val="1396734122"/>
+      </p:ext>
+    </p:extLst>
+  </p:cSld>
+  <p:clrMapOvr>
+    <a:masterClrMapping/>
+  </p:clrMapOvr>
+  <p:timing>
+    <p:tnLst>
+      <p:par>
+        <p:cTn id="1" dur="indefinite" restart="never" nodeType="tmRoot"/>
+      </p:par>
+    </p:tnLst>
+  </p:timing>
+</p:sld>
+</file>
+
+<file path=ppt/slides/slide22.xml><?xml version="1.0" encoding="utf-8"?>
+<p:sld xmlns:a="http://schemas.openxmlformats.org/drawingml/2006/main" xmlns:r="http://schemas.openxmlformats.org/officeDocument/2006/relationships" xmlns:p="http://schemas.openxmlformats.org/presentationml/2006/main">
+  <p:cSld>
+    <p:spTree>
+      <p:nvGrpSpPr>
+        <p:cNvPr id="1" name=""/>
+        <p:cNvGrpSpPr/>
+        <p:nvPr/>
+      </p:nvGrpSpPr>
+      <p:grpSpPr>
+        <a:xfrm>
+          <a:off x="0" y="0"/>
+          <a:ext cx="0" cy="0"/>
+          <a:chOff x="0" y="0"/>
+          <a:chExt cx="0" cy="0"/>
+        </a:xfrm>
+      </p:grpSpPr>
+      <p:sp>
+        <p:nvSpPr>
+          <p:cNvPr id="2" name="Text Placeholder 1"/>
+          <p:cNvSpPr>
+            <a:spLocks noGrp="1"/>
+          </p:cNvSpPr>
+          <p:nvPr>
+            <p:ph type="body" sz="quarter" idx="13"/>
+          </p:nvPr>
+        </p:nvSpPr>
+        <p:spPr/>
+        <p:txBody>
+          <a:bodyPr/>
+          <a:lstStyle/>
+          <a:p>
+            <a:endParaRPr lang="en-US" dirty="0"/>
+          </a:p>
+        </p:txBody>
+      </p:sp>
+      <p:sp>
+        <p:nvSpPr>
+          <p:cNvPr id="17" name="Title 16"/>
+          <p:cNvSpPr>
+            <a:spLocks noGrp="1"/>
+          </p:cNvSpPr>
+          <p:nvPr>
+            <p:ph type="title"/>
+          </p:nvPr>
+        </p:nvSpPr>
+        <p:spPr/>
+        <p:txBody>
+          <a:bodyPr/>
+          <a:lstStyle/>
+          <a:p>
+            <a:r>
+              <a:rPr lang="en-US" dirty="0" smtClean="0"/>
+              <a:t>Conclusions</a:t>
+            </a:r>
+            <a:endParaRPr lang="en-US" dirty="0"/>
+          </a:p>
+        </p:txBody>
+      </p:sp>
+      <p:pic>
+        <p:nvPicPr>
+          <p:cNvPr id="2050" name="Picture 2" descr="C:\Users\pmascolo\Downloads\5392200475_c71f2d2569_z.jpg"/>
+          <p:cNvPicPr>
+            <a:picLocks noChangeAspect="1" noChangeArrowheads="1"/>
+          </p:cNvPicPr>
+          <p:nvPr/>
+        </p:nvPicPr>
+        <p:blipFill>
+          <a:blip r:embed="rId3">
+            <a:extLst>
+              <a:ext uri="{28A0092B-C50C-407E-A947-70E740481C1C}">
+                <a14:useLocalDpi xmlns:a14="http://schemas.microsoft.com/office/drawing/2010/main" val="0"/>
+              </a:ext>
+            </a:extLst>
+          </a:blip>
+          <a:srcRect/>
+          <a:stretch>
+            <a:fillRect/>
+          </a:stretch>
+        </p:blipFill>
+        <p:spPr bwMode="auto">
+          <a:xfrm>
+            <a:off x="911225" y="2635366"/>
+            <a:ext cx="7366442" cy="3245669"/>
+          </a:xfrm>
+          <a:prstGeom prst="rect">
+            <a:avLst/>
+          </a:prstGeom>
+          <a:noFill/>
+          <a:extLst>
+            <a:ext uri="{909E8E84-426E-40DD-AFC4-6F175D3DCCD1}">
+              <a14:hiddenFill xmlns:a14="http://schemas.microsoft.com/office/drawing/2010/main">
+                <a:solidFill>
+                  <a:srgbClr val="FFFFFF"/>
+                </a:solidFill>
+              </a14:hiddenFill>
+            </a:ext>
+          </a:extLst>
+        </p:spPr>
+      </p:pic>
+      <p:sp>
+        <p:nvSpPr>
+          <p:cNvPr id="3" name="TextBox 2"/>
+          <p:cNvSpPr txBox="1"/>
+          <p:nvPr/>
+        </p:nvSpPr>
+        <p:spPr>
+          <a:xfrm>
+            <a:off x="2515479" y="1867301"/>
+            <a:ext cx="4157933" cy="523220"/>
+          </a:xfrm>
+          <a:prstGeom prst="rect">
+            <a:avLst/>
+          </a:prstGeom>
+          <a:noFill/>
+        </p:spPr>
+        <p:txBody>
+          <a:bodyPr wrap="none" rtlCol="0">
+            <a:spAutoFit/>
+          </a:bodyPr>
+          <a:lstStyle/>
+          <a:p>
+            <a:r>
+              <a:rPr lang="en-IE" sz="2800" b="1" dirty="0" smtClean="0"/>
+              <a:t>It’s a Brave New World!</a:t>
+            </a:r>
+            <a:endParaRPr lang="en-US" sz="2800" b="1" dirty="0" err="1" smtClean="0"/>
+          </a:p>
+        </p:txBody>
+      </p:sp>
+    </p:spTree>
+    <p:extLst>
+      <p:ext uri="{BB962C8B-B14F-4D97-AF65-F5344CB8AC3E}">
+        <p14:creationId xmlns:p14="http://schemas.microsoft.com/office/powerpoint/2010/main" val="1386234047"/>
+      </p:ext>
+    </p:extLst>
+  </p:cSld>
+  <p:clrMapOvr>
+    <a:masterClrMapping/>
+  </p:clrMapOvr>
+  <mc:AlternateContent xmlns:mc="http://schemas.openxmlformats.org/markup-compatibility/2006" xmlns:p14="http://schemas.microsoft.com/office/powerpoint/2010/main">
+    <mc:Choice Requires="p14">
+      <p:transition spd="med" p14:dur="700">
+        <p:fade/>
+      </p:transition>
+    </mc:Choice>
+    <mc:Fallback xmlns="">
+      <p:transition spd="med">
+        <p:fade/>
+      </p:transition>
+    </mc:Fallback>
+  </mc:AlternateContent>
+  <p:timing>
+    <p:tnLst>
+      <p:par>
+        <p:cTn id="1" dur="indefinite" restart="never" nodeType="tmRoot"/>
+      </p:par>
+    </p:tnLst>
+  </p:timing>
+</p:sld>
+</file>
+
+<file path=ppt/slides/slide23.xml><?xml version="1.0" encoding="utf-8"?>
+<p:sld xmlns:a="http://schemas.openxmlformats.org/drawingml/2006/main" xmlns:r="http://schemas.openxmlformats.org/officeDocument/2006/relationships" xmlns:p="http://schemas.openxmlformats.org/presentationml/2006/main">
+  <p:cSld>
+    <p:spTree>
+      <p:nvGrpSpPr>
+        <p:cNvPr id="1" name=""/>
+        <p:cNvGrpSpPr/>
+        <p:nvPr/>
+      </p:nvGrpSpPr>
+      <p:grpSpPr>
+        <a:xfrm>
+          <a:off x="0" y="0"/>
+          <a:ext cx="0" cy="0"/>
+          <a:chOff x="0" y="0"/>
+          <a:chExt cx="0" cy="0"/>
+        </a:xfrm>
+      </p:grpSpPr>
+      <p:sp>
+        <p:nvSpPr>
+          <p:cNvPr id="2" name="Text Placeholder 1"/>
+          <p:cNvSpPr>
+            <a:spLocks noGrp="1"/>
+          </p:cNvSpPr>
+          <p:nvPr>
+            <p:ph type="body" sz="quarter" idx="13"/>
+          </p:nvPr>
+        </p:nvSpPr>
+        <p:spPr/>
+        <p:txBody>
+          <a:bodyPr/>
+          <a:lstStyle/>
+          <a:p>
+            <a:endParaRPr lang="en-US" dirty="0"/>
+          </a:p>
+        </p:txBody>
+      </p:sp>
+      <p:sp>
+        <p:nvSpPr>
+          <p:cNvPr id="17" name="Title 16"/>
+          <p:cNvSpPr>
+            <a:spLocks noGrp="1"/>
+          </p:cNvSpPr>
+          <p:nvPr>
+            <p:ph type="title"/>
+          </p:nvPr>
+        </p:nvSpPr>
+        <p:spPr/>
+        <p:txBody>
+          <a:bodyPr/>
+          <a:lstStyle/>
+          <a:p>
+            <a:r>
+              <a:rPr lang="en-IE" dirty="0" smtClean="0"/>
+              <a:t>Q/A</a:t>
+            </a:r>
+            <a:endParaRPr lang="en-US" dirty="0"/>
+          </a:p>
+        </p:txBody>
+      </p:sp>
+      <p:pic>
+        <p:nvPicPr>
+          <p:cNvPr id="3" name="Picture 2"/>
+          <p:cNvPicPr>
+            <a:picLocks noChangeAspect="1"/>
+          </p:cNvPicPr>
+          <p:nvPr/>
+        </p:nvPicPr>
+        <p:blipFill>
+          <a:blip r:embed="rId3">
+            <a:extLst>
+              <a:ext uri="{28A0092B-C50C-407E-A947-70E740481C1C}">
+                <a14:useLocalDpi xmlns:a14="http://schemas.microsoft.com/office/drawing/2010/main" val="0"/>
+              </a:ext>
+            </a:extLst>
+          </a:blip>
+          <a:stretch>
+            <a:fillRect/>
+          </a:stretch>
+        </p:blipFill>
+        <p:spPr>
+          <a:xfrm>
+            <a:off x="572876" y="1738828"/>
+            <a:ext cx="8009263" cy="4528744"/>
+          </a:xfrm>
+          <a:prstGeom prst="rect">
+            <a:avLst/>
+          </a:prstGeom>
+        </p:spPr>
+      </p:pic>
+    </p:spTree>
+    <p:extLst>
+      <p:ext uri="{BB962C8B-B14F-4D97-AF65-F5344CB8AC3E}">
+        <p14:creationId xmlns:p14="http://schemas.microsoft.com/office/powerpoint/2010/main" val="1002772693"/>
+      </p:ext>
+    </p:extLst>
+  </p:cSld>
+  <p:clrMapOvr>
+    <a:masterClrMapping/>
+  </p:clrMapOvr>
+  <mc:AlternateContent xmlns:mc="http://schemas.openxmlformats.org/markup-compatibility/2006" xmlns:p14="http://schemas.microsoft.com/office/powerpoint/2010/main">
+    <mc:Choice Requires="p14">
+      <p:transition spd="med" p14:dur="700">
+        <p:fade/>
+      </p:transition>
+    </mc:Choice>
+    <mc:Fallback xmlns="">
+      <p:transition spd="med">
+        <p:fade/>
+      </p:transition>
+    </mc:Fallback>
+  </mc:AlternateContent>
+  <p:timing>
+    <p:tnLst>
+      <p:par>
+        <p:cTn id="1" dur="indefinite" restart="never" nodeType="tmRoot"/>
+      </p:par>
+    </p:tnLst>
+  </p:timing>
+</p:sld>
+</file>
+
+<file path=ppt/slides/slide24.xml><?xml version="1.0" encoding="utf-8"?>
+<p:sld xmlns:a="http://schemas.openxmlformats.org/drawingml/2006/main" xmlns:r="http://schemas.openxmlformats.org/officeDocument/2006/relationships" xmlns:p="http://schemas.openxmlformats.org/presentationml/2006/main">
+  <p:cSld>
+    <p:spTree>
+      <p:nvGrpSpPr>
+        <p:cNvPr id="1" name=""/>
+        <p:cNvGrpSpPr/>
+        <p:nvPr/>
+      </p:nvGrpSpPr>
+      <p:grpSpPr>
+        <a:xfrm>
+          <a:off x="0" y="0"/>
+          <a:ext cx="0" cy="0"/>
+          <a:chOff x="0" y="0"/>
+          <a:chExt cx="0" cy="0"/>
+        </a:xfrm>
+      </p:grpSpPr>
+      <p:sp>
+        <p:nvSpPr>
+          <p:cNvPr id="2" name="Text Placeholder 1"/>
+          <p:cNvSpPr>
+            <a:spLocks noGrp="1"/>
+          </p:cNvSpPr>
+          <p:nvPr>
+            <p:ph type="body" sz="quarter" idx="13"/>
+          </p:nvPr>
+        </p:nvSpPr>
+        <p:spPr/>
+        <p:txBody>
+          <a:bodyPr/>
+          <a:lstStyle/>
+          <a:p>
+            <a:endParaRPr lang="en-US" dirty="0"/>
+          </a:p>
+        </p:txBody>
+      </p:sp>
+      <p:sp>
+        <p:nvSpPr>
+          <p:cNvPr id="17" name="Title 16"/>
+          <p:cNvSpPr>
+            <a:spLocks noGrp="1"/>
+          </p:cNvSpPr>
+          <p:nvPr>
+            <p:ph type="title"/>
+          </p:nvPr>
+        </p:nvSpPr>
+        <p:spPr>
+          <a:xfrm>
+            <a:off x="427933" y="3159514"/>
+            <a:ext cx="8396863" cy="620358"/>
+          </a:xfrm>
+        </p:spPr>
+        <p:txBody>
+          <a:bodyPr/>
+          <a:lstStyle/>
+          <a:p>
+            <a:pPr algn="ctr"/>
+            <a:r>
+              <a:rPr lang="en-US" dirty="0" smtClean="0"/>
+              <a:t>Thanks for your attention!</a:t>
             </a:r>
             <a:endParaRPr lang="en-US" dirty="0"/>
           </a:p>
@@ -19911,11 +22382,7 @@
           <a:p>
             <a:r>
               <a:rPr lang="en-US" sz="2800" dirty="0" smtClean="0"/>
-              <a:t>About </a:t>
-            </a:r>
-            <a:r>
-              <a:rPr lang="en-US" sz="2800" dirty="0" smtClean="0"/>
-              <a:t>me – What I do</a:t>
+              <a:t>About me – What I do</a:t>
             </a:r>
             <a:endParaRPr lang="en-US" sz="2800" dirty="0"/>
           </a:p>
@@ -23967,11 +26434,7 @@
 
 <file path=customXml/item1.xml><?xml version="1.0" encoding="utf-8"?>
 <?mso-contentType ?>
-<FormTemplates xmlns="http://schemas.microsoft.com/sharepoint/v3/contenttype/forms">
-  <Display>DocumentLibraryForm</Display>
-  <Edit>DocumentLibraryForm</Edit>
-  <New>DocumentLibraryForm</New>
-</FormTemplates>
+<SharedContentType xmlns="Microsoft.SharePoint.Taxonomy.ContentTypeSync" SourceId="897a53ec-2016-4aee-8be4-ce9632eb08ca" ContentTypeId="0x0101" PreviousValue="false"/>
 </file>
 
 <file path=customXml/item2.xml><?xml version="1.0" encoding="utf-8"?>
@@ -24161,10 +26624,19 @@
 
 <file path=customXml/item3.xml><?xml version="1.0" encoding="utf-8"?>
 <?mso-contentType ?>
-<SharedContentType xmlns="Microsoft.SharePoint.Taxonomy.ContentTypeSync" SourceId="897a53ec-2016-4aee-8be4-ce9632eb08ca" ContentTypeId="0x0101" PreviousValue="false"/>
+<FormTemplates xmlns="http://schemas.microsoft.com/sharepoint/v3/contenttype/forms">
+  <Display>DocumentLibraryForm</Display>
+  <Edit>DocumentLibraryForm</Edit>
+  <New>DocumentLibraryForm</New>
+</FormTemplates>
 </file>
 
 <file path=customXml/item4.xml><?xml version="1.0" encoding="utf-8"?>
+<?mso-contentType ?>
+<spe:Receivers xmlns:spe="http://schemas.microsoft.com/sharepoint/events"/>
+</file>
+
+<file path=customXml/item5.xml><?xml version="1.0" encoding="utf-8"?>
 <p:properties xmlns:p="http://schemas.microsoft.com/office/2006/metadata/properties" xmlns:xsi="http://www.w3.org/2001/XMLSchema-instance" xmlns:pc="http://schemas.microsoft.com/office/infopath/2007/PartnerControls">
   <documentManagement>
     <TaxCatchAll xmlns="d6619361-6733-4889-8a96-470efa1f75f4"/>
@@ -24173,15 +26645,10 @@
 </p:properties>
 </file>
 
-<file path=customXml/item5.xml><?xml version="1.0" encoding="utf-8"?>
-<?mso-contentType ?>
-<spe:Receivers xmlns:spe="http://schemas.microsoft.com/sharepoint/events"/>
-</file>
-
 <file path=customXml/itemProps1.xml><?xml version="1.0" encoding="utf-8"?>
-<ds:datastoreItem xmlns:ds="http://schemas.openxmlformats.org/officeDocument/2006/customXml" ds:itemID="{25ED5C46-2B6C-466C-AFA1-EE63242E5400}">
+<ds:datastoreItem xmlns:ds="http://schemas.openxmlformats.org/officeDocument/2006/customXml" ds:itemID="{047420BB-D876-40A8-8D44-33C265F54C54}">
   <ds:schemaRefs>
-    <ds:schemaRef ds:uri="http://schemas.microsoft.com/sharepoint/v3/contenttype/forms"/>
+    <ds:schemaRef ds:uri="Microsoft.SharePoint.Taxonomy.ContentTypeSync"/>
   </ds:schemaRefs>
 </ds:datastoreItem>
 </file>
@@ -24206,14 +26673,22 @@
 </file>
 
 <file path=customXml/itemProps3.xml><?xml version="1.0" encoding="utf-8"?>
-<ds:datastoreItem xmlns:ds="http://schemas.openxmlformats.org/officeDocument/2006/customXml" ds:itemID="{047420BB-D876-40A8-8D44-33C265F54C54}">
+<ds:datastoreItem xmlns:ds="http://schemas.openxmlformats.org/officeDocument/2006/customXml" ds:itemID="{25ED5C46-2B6C-466C-AFA1-EE63242E5400}">
   <ds:schemaRefs>
-    <ds:schemaRef ds:uri="Microsoft.SharePoint.Taxonomy.ContentTypeSync"/>
+    <ds:schemaRef ds:uri="http://schemas.microsoft.com/sharepoint/v3/contenttype/forms"/>
   </ds:schemaRefs>
 </ds:datastoreItem>
 </file>
 
 <file path=customXml/itemProps4.xml><?xml version="1.0" encoding="utf-8"?>
+<ds:datastoreItem xmlns:ds="http://schemas.openxmlformats.org/officeDocument/2006/customXml" ds:itemID="{E59B90FC-39F4-403E-BEA7-F9A1D83390C7}">
+  <ds:schemaRefs>
+    <ds:schemaRef ds:uri="http://schemas.microsoft.com/sharepoint/events"/>
+  </ds:schemaRefs>
+</ds:datastoreItem>
+</file>
+
+<file path=customXml/itemProps5.xml><?xml version="1.0" encoding="utf-8"?>
 <ds:datastoreItem xmlns:ds="http://schemas.openxmlformats.org/officeDocument/2006/customXml" ds:itemID="{F8082CB4-9A0E-44A4-8772-16826589D3F3}">
   <ds:schemaRefs>
     <ds:schemaRef ds:uri="http://schemas.microsoft.com/office/2006/documentManagement/types"/>
@@ -24228,12 +26703,4 @@
     <ds:schemaRef ds:uri="http://purl.org/dc/terms/"/>
   </ds:schemaRefs>
 </ds:datastoreItem>
-</file>
-
-<file path=customXml/itemProps5.xml><?xml version="1.0" encoding="utf-8"?>
-<ds:datastoreItem xmlns:ds="http://schemas.openxmlformats.org/officeDocument/2006/customXml" ds:itemID="{E59B90FC-39F4-403E-BEA7-F9A1D83390C7}">
-  <ds:schemaRefs>
-    <ds:schemaRef ds:uri="http://schemas.microsoft.com/sharepoint/events"/>
-  </ds:schemaRefs>
-</ds:datastoreItem>
 </file>
</xml_diff>